<commit_message>
Organização de funções 2
organizando as ultimas funções adicionadas.
</commit_message>
<xml_diff>
--- a/ARQUIVOS DE ORGANIZAÇÃO/organizando_funcoes.pptx
+++ b/ARQUIVOS DE ORGANIZAÇÃO/organizando_funcoes.pptx
@@ -4,12 +4,16 @@
   <p:sldMasterIdLst>
     <p:sldMasterId id="2147483648" r:id="rId1"/>
   </p:sldMasterIdLst>
+  <p:notesMasterIdLst>
+    <p:notesMasterId r:id="rId8"/>
+  </p:notesMasterIdLst>
   <p:sldIdLst>
     <p:sldId id="256" r:id="rId2"/>
-    <p:sldId id="257" r:id="rId3"/>
-    <p:sldId id="258" r:id="rId4"/>
-    <p:sldId id="259" r:id="rId5"/>
-    <p:sldId id="260" r:id="rId6"/>
+    <p:sldId id="261" r:id="rId3"/>
+    <p:sldId id="257" r:id="rId4"/>
+    <p:sldId id="258" r:id="rId5"/>
+    <p:sldId id="259" r:id="rId6"/>
+    <p:sldId id="260" r:id="rId7"/>
   </p:sldIdLst>
   <p:sldSz cx="12192000" cy="6858000"/>
   <p:notesSz cx="6858000" cy="9144000"/>
@@ -116,6 +120,439 @@
 </p:presentation>
 </file>
 
+<file path=ppt/notesMasters/notesMaster1.xml><?xml version="1.0" encoding="utf-8"?>
+<p:notesMaster xmlns:a="http://schemas.openxmlformats.org/drawingml/2006/main" xmlns:r="http://schemas.openxmlformats.org/officeDocument/2006/relationships" xmlns:p="http://schemas.openxmlformats.org/presentationml/2006/main">
+  <p:cSld>
+    <p:bg>
+      <p:bgRef idx="1001">
+        <a:schemeClr val="bg1"/>
+      </p:bgRef>
+    </p:bg>
+    <p:spTree>
+      <p:nvGrpSpPr>
+        <p:cNvPr id="1" name=""/>
+        <p:cNvGrpSpPr/>
+        <p:nvPr/>
+      </p:nvGrpSpPr>
+      <p:grpSpPr>
+        <a:xfrm>
+          <a:off x="0" y="0"/>
+          <a:ext cx="0" cy="0"/>
+          <a:chOff x="0" y="0"/>
+          <a:chExt cx="0" cy="0"/>
+        </a:xfrm>
+      </p:grpSpPr>
+      <p:sp>
+        <p:nvSpPr>
+          <p:cNvPr id="2" name="Espaço Reservado para Cabeçalho 1"/>
+          <p:cNvSpPr>
+            <a:spLocks noGrp="1"/>
+          </p:cNvSpPr>
+          <p:nvPr>
+            <p:ph type="hdr" sz="quarter"/>
+          </p:nvPr>
+        </p:nvSpPr>
+        <p:spPr>
+          <a:xfrm>
+            <a:off x="0" y="0"/>
+            <a:ext cx="2971800" cy="458788"/>
+          </a:xfrm>
+          <a:prstGeom prst="rect">
+            <a:avLst/>
+          </a:prstGeom>
+        </p:spPr>
+        <p:txBody>
+          <a:bodyPr vert="horz" lIns="91440" tIns="45720" rIns="91440" bIns="45720" rtlCol="0"/>
+          <a:lstStyle>
+            <a:lvl1pPr algn="l">
+              <a:defRPr sz="1200"/>
+            </a:lvl1pPr>
+          </a:lstStyle>
+          <a:p>
+            <a:endParaRPr lang="pt-BR"/>
+          </a:p>
+        </p:txBody>
+      </p:sp>
+      <p:sp>
+        <p:nvSpPr>
+          <p:cNvPr id="3" name="Espaço Reservado para Data 2"/>
+          <p:cNvSpPr>
+            <a:spLocks noGrp="1"/>
+          </p:cNvSpPr>
+          <p:nvPr>
+            <p:ph type="dt" idx="1"/>
+          </p:nvPr>
+        </p:nvSpPr>
+        <p:spPr>
+          <a:xfrm>
+            <a:off x="3884613" y="0"/>
+            <a:ext cx="2971800" cy="458788"/>
+          </a:xfrm>
+          <a:prstGeom prst="rect">
+            <a:avLst/>
+          </a:prstGeom>
+        </p:spPr>
+        <p:txBody>
+          <a:bodyPr vert="horz" lIns="91440" tIns="45720" rIns="91440" bIns="45720" rtlCol="0"/>
+          <a:lstStyle>
+            <a:lvl1pPr algn="r">
+              <a:defRPr sz="1200"/>
+            </a:lvl1pPr>
+          </a:lstStyle>
+          <a:p>
+            <a:fld id="{5C4CE316-22BA-41D4-AB68-ECEEAF67B735}" type="datetimeFigureOut">
+              <a:rPr lang="pt-BR" smtClean="0"/>
+              <a:t>14/06/2022</a:t>
+            </a:fld>
+            <a:endParaRPr lang="pt-BR"/>
+          </a:p>
+        </p:txBody>
+      </p:sp>
+      <p:sp>
+        <p:nvSpPr>
+          <p:cNvPr id="4" name="Espaço Reservado para Imagem de Slide 3"/>
+          <p:cNvSpPr>
+            <a:spLocks noGrp="1" noRot="1" noChangeAspect="1"/>
+          </p:cNvSpPr>
+          <p:nvPr>
+            <p:ph type="sldImg" idx="2"/>
+          </p:nvPr>
+        </p:nvSpPr>
+        <p:spPr>
+          <a:xfrm>
+            <a:off x="685800" y="1143000"/>
+            <a:ext cx="5486400" cy="3086100"/>
+          </a:xfrm>
+          <a:prstGeom prst="rect">
+            <a:avLst/>
+          </a:prstGeom>
+          <a:noFill/>
+          <a:ln w="12700">
+            <a:solidFill>
+              <a:prstClr val="black"/>
+            </a:solidFill>
+          </a:ln>
+        </p:spPr>
+        <p:txBody>
+          <a:bodyPr vert="horz" lIns="91440" tIns="45720" rIns="91440" bIns="45720" rtlCol="0" anchor="ctr"/>
+          <a:lstStyle/>
+          <a:p>
+            <a:endParaRPr lang="pt-BR"/>
+          </a:p>
+        </p:txBody>
+      </p:sp>
+      <p:sp>
+        <p:nvSpPr>
+          <p:cNvPr id="5" name="Espaço Reservado para Anotações 4"/>
+          <p:cNvSpPr>
+            <a:spLocks noGrp="1"/>
+          </p:cNvSpPr>
+          <p:nvPr>
+            <p:ph type="body" sz="quarter" idx="3"/>
+          </p:nvPr>
+        </p:nvSpPr>
+        <p:spPr>
+          <a:xfrm>
+            <a:off x="685800" y="4400550"/>
+            <a:ext cx="5486400" cy="3600450"/>
+          </a:xfrm>
+          <a:prstGeom prst="rect">
+            <a:avLst/>
+          </a:prstGeom>
+        </p:spPr>
+        <p:txBody>
+          <a:bodyPr vert="horz" lIns="91440" tIns="45720" rIns="91440" bIns="45720" rtlCol="0"/>
+          <a:lstStyle/>
+          <a:p>
+            <a:pPr lvl="0"/>
+            <a:r>
+              <a:rPr lang="pt-BR"/>
+              <a:t>Clique para editar os estilos de texto Mestres</a:t>
+            </a:r>
+          </a:p>
+          <a:p>
+            <a:pPr lvl="1"/>
+            <a:r>
+              <a:rPr lang="pt-BR"/>
+              <a:t>Segundo nível</a:t>
+            </a:r>
+          </a:p>
+          <a:p>
+            <a:pPr lvl="2"/>
+            <a:r>
+              <a:rPr lang="pt-BR"/>
+              <a:t>Terceiro nível</a:t>
+            </a:r>
+          </a:p>
+          <a:p>
+            <a:pPr lvl="3"/>
+            <a:r>
+              <a:rPr lang="pt-BR"/>
+              <a:t>Quarto nível</a:t>
+            </a:r>
+          </a:p>
+          <a:p>
+            <a:pPr lvl="4"/>
+            <a:r>
+              <a:rPr lang="pt-BR"/>
+              <a:t>Quinto nível</a:t>
+            </a:r>
+          </a:p>
+        </p:txBody>
+      </p:sp>
+      <p:sp>
+        <p:nvSpPr>
+          <p:cNvPr id="6" name="Espaço Reservado para Rodapé 5"/>
+          <p:cNvSpPr>
+            <a:spLocks noGrp="1"/>
+          </p:cNvSpPr>
+          <p:nvPr>
+            <p:ph type="ftr" sz="quarter" idx="4"/>
+          </p:nvPr>
+        </p:nvSpPr>
+        <p:spPr>
+          <a:xfrm>
+            <a:off x="0" y="8685213"/>
+            <a:ext cx="2971800" cy="458787"/>
+          </a:xfrm>
+          <a:prstGeom prst="rect">
+            <a:avLst/>
+          </a:prstGeom>
+        </p:spPr>
+        <p:txBody>
+          <a:bodyPr vert="horz" lIns="91440" tIns="45720" rIns="91440" bIns="45720" rtlCol="0" anchor="b"/>
+          <a:lstStyle>
+            <a:lvl1pPr algn="l">
+              <a:defRPr sz="1200"/>
+            </a:lvl1pPr>
+          </a:lstStyle>
+          <a:p>
+            <a:endParaRPr lang="pt-BR"/>
+          </a:p>
+        </p:txBody>
+      </p:sp>
+      <p:sp>
+        <p:nvSpPr>
+          <p:cNvPr id="7" name="Espaço Reservado para Número de Slide 6"/>
+          <p:cNvSpPr>
+            <a:spLocks noGrp="1"/>
+          </p:cNvSpPr>
+          <p:nvPr>
+            <p:ph type="sldNum" sz="quarter" idx="5"/>
+          </p:nvPr>
+        </p:nvSpPr>
+        <p:spPr>
+          <a:xfrm>
+            <a:off x="3884613" y="8685213"/>
+            <a:ext cx="2971800" cy="458787"/>
+          </a:xfrm>
+          <a:prstGeom prst="rect">
+            <a:avLst/>
+          </a:prstGeom>
+        </p:spPr>
+        <p:txBody>
+          <a:bodyPr vert="horz" lIns="91440" tIns="45720" rIns="91440" bIns="45720" rtlCol="0" anchor="b"/>
+          <a:lstStyle>
+            <a:lvl1pPr algn="r">
+              <a:defRPr sz="1200"/>
+            </a:lvl1pPr>
+          </a:lstStyle>
+          <a:p>
+            <a:fld id="{B5025C0B-CE56-4DBD-9510-10912670B991}" type="slidenum">
+              <a:rPr lang="pt-BR" smtClean="0"/>
+              <a:t>‹nº›</a:t>
+            </a:fld>
+            <a:endParaRPr lang="pt-BR"/>
+          </a:p>
+        </p:txBody>
+      </p:sp>
+    </p:spTree>
+    <p:extLst>
+      <p:ext uri="{BB962C8B-B14F-4D97-AF65-F5344CB8AC3E}">
+        <p14:creationId xmlns:p14="http://schemas.microsoft.com/office/powerpoint/2010/main" val="4240549852"/>
+      </p:ext>
+    </p:extLst>
+  </p:cSld>
+  <p:clrMap bg1="lt1" tx1="dk1" bg2="lt2" tx2="dk2" accent1="accent1" accent2="accent2" accent3="accent3" accent4="accent4" accent5="accent5" accent6="accent6" hlink="hlink" folHlink="folHlink"/>
+  <p:notesStyle>
+    <a:lvl1pPr marL="0" algn="l" defTabSz="914400" rtl="0" eaLnBrk="1" latinLnBrk="0" hangingPunct="1">
+      <a:defRPr sz="1200" kern="1200">
+        <a:solidFill>
+          <a:schemeClr val="tx1"/>
+        </a:solidFill>
+        <a:latin typeface="+mn-lt"/>
+        <a:ea typeface="+mn-ea"/>
+        <a:cs typeface="+mn-cs"/>
+      </a:defRPr>
+    </a:lvl1pPr>
+    <a:lvl2pPr marL="457200" algn="l" defTabSz="914400" rtl="0" eaLnBrk="1" latinLnBrk="0" hangingPunct="1">
+      <a:defRPr sz="1200" kern="1200">
+        <a:solidFill>
+          <a:schemeClr val="tx1"/>
+        </a:solidFill>
+        <a:latin typeface="+mn-lt"/>
+        <a:ea typeface="+mn-ea"/>
+        <a:cs typeface="+mn-cs"/>
+      </a:defRPr>
+    </a:lvl2pPr>
+    <a:lvl3pPr marL="914400" algn="l" defTabSz="914400" rtl="0" eaLnBrk="1" latinLnBrk="0" hangingPunct="1">
+      <a:defRPr sz="1200" kern="1200">
+        <a:solidFill>
+          <a:schemeClr val="tx1"/>
+        </a:solidFill>
+        <a:latin typeface="+mn-lt"/>
+        <a:ea typeface="+mn-ea"/>
+        <a:cs typeface="+mn-cs"/>
+      </a:defRPr>
+    </a:lvl3pPr>
+    <a:lvl4pPr marL="1371600" algn="l" defTabSz="914400" rtl="0" eaLnBrk="1" latinLnBrk="0" hangingPunct="1">
+      <a:defRPr sz="1200" kern="1200">
+        <a:solidFill>
+          <a:schemeClr val="tx1"/>
+        </a:solidFill>
+        <a:latin typeface="+mn-lt"/>
+        <a:ea typeface="+mn-ea"/>
+        <a:cs typeface="+mn-cs"/>
+      </a:defRPr>
+    </a:lvl4pPr>
+    <a:lvl5pPr marL="1828800" algn="l" defTabSz="914400" rtl="0" eaLnBrk="1" latinLnBrk="0" hangingPunct="1">
+      <a:defRPr sz="1200" kern="1200">
+        <a:solidFill>
+          <a:schemeClr val="tx1"/>
+        </a:solidFill>
+        <a:latin typeface="+mn-lt"/>
+        <a:ea typeface="+mn-ea"/>
+        <a:cs typeface="+mn-cs"/>
+      </a:defRPr>
+    </a:lvl5pPr>
+    <a:lvl6pPr marL="2286000" algn="l" defTabSz="914400" rtl="0" eaLnBrk="1" latinLnBrk="0" hangingPunct="1">
+      <a:defRPr sz="1200" kern="1200">
+        <a:solidFill>
+          <a:schemeClr val="tx1"/>
+        </a:solidFill>
+        <a:latin typeface="+mn-lt"/>
+        <a:ea typeface="+mn-ea"/>
+        <a:cs typeface="+mn-cs"/>
+      </a:defRPr>
+    </a:lvl6pPr>
+    <a:lvl7pPr marL="2743200" algn="l" defTabSz="914400" rtl="0" eaLnBrk="1" latinLnBrk="0" hangingPunct="1">
+      <a:defRPr sz="1200" kern="1200">
+        <a:solidFill>
+          <a:schemeClr val="tx1"/>
+        </a:solidFill>
+        <a:latin typeface="+mn-lt"/>
+        <a:ea typeface="+mn-ea"/>
+        <a:cs typeface="+mn-cs"/>
+      </a:defRPr>
+    </a:lvl7pPr>
+    <a:lvl8pPr marL="3200400" algn="l" defTabSz="914400" rtl="0" eaLnBrk="1" latinLnBrk="0" hangingPunct="1">
+      <a:defRPr sz="1200" kern="1200">
+        <a:solidFill>
+          <a:schemeClr val="tx1"/>
+        </a:solidFill>
+        <a:latin typeface="+mn-lt"/>
+        <a:ea typeface="+mn-ea"/>
+        <a:cs typeface="+mn-cs"/>
+      </a:defRPr>
+    </a:lvl8pPr>
+    <a:lvl9pPr marL="3657600" algn="l" defTabSz="914400" rtl="0" eaLnBrk="1" latinLnBrk="0" hangingPunct="1">
+      <a:defRPr sz="1200" kern="1200">
+        <a:solidFill>
+          <a:schemeClr val="tx1"/>
+        </a:solidFill>
+        <a:latin typeface="+mn-lt"/>
+        <a:ea typeface="+mn-ea"/>
+        <a:cs typeface="+mn-cs"/>
+      </a:defRPr>
+    </a:lvl9pPr>
+  </p:notesStyle>
+</p:notesMaster>
+</file>
+
+<file path=ppt/notesSlides/notesSlide1.xml><?xml version="1.0" encoding="utf-8"?>
+<p:notes xmlns:a="http://schemas.openxmlformats.org/drawingml/2006/main" xmlns:r="http://schemas.openxmlformats.org/officeDocument/2006/relationships" xmlns:p="http://schemas.openxmlformats.org/presentationml/2006/main">
+  <p:cSld>
+    <p:spTree>
+      <p:nvGrpSpPr>
+        <p:cNvPr id="1" name=""/>
+        <p:cNvGrpSpPr/>
+        <p:nvPr/>
+      </p:nvGrpSpPr>
+      <p:grpSpPr>
+        <a:xfrm>
+          <a:off x="0" y="0"/>
+          <a:ext cx="0" cy="0"/>
+          <a:chOff x="0" y="0"/>
+          <a:chExt cx="0" cy="0"/>
+        </a:xfrm>
+      </p:grpSpPr>
+      <p:sp>
+        <p:nvSpPr>
+          <p:cNvPr id="2" name="Espaço Reservado para Imagem de Slide 1"/>
+          <p:cNvSpPr>
+            <a:spLocks noGrp="1" noRot="1" noChangeAspect="1"/>
+          </p:cNvSpPr>
+          <p:nvPr>
+            <p:ph type="sldImg"/>
+          </p:nvPr>
+        </p:nvSpPr>
+        <p:spPr/>
+      </p:sp>
+      <p:sp>
+        <p:nvSpPr>
+          <p:cNvPr id="3" name="Espaço Reservado para Anotações 2"/>
+          <p:cNvSpPr>
+            <a:spLocks noGrp="1"/>
+          </p:cNvSpPr>
+          <p:nvPr>
+            <p:ph type="body" idx="1"/>
+          </p:nvPr>
+        </p:nvSpPr>
+        <p:spPr/>
+        <p:txBody>
+          <a:bodyPr/>
+          <a:lstStyle/>
+          <a:p>
+            <a:endParaRPr lang="pt-BR" dirty="0"/>
+          </a:p>
+        </p:txBody>
+      </p:sp>
+      <p:sp>
+        <p:nvSpPr>
+          <p:cNvPr id="4" name="Espaço Reservado para Número de Slide 3"/>
+          <p:cNvSpPr>
+            <a:spLocks noGrp="1"/>
+          </p:cNvSpPr>
+          <p:nvPr>
+            <p:ph type="sldNum" sz="quarter" idx="5"/>
+          </p:nvPr>
+        </p:nvSpPr>
+        <p:spPr/>
+        <p:txBody>
+          <a:bodyPr/>
+          <a:lstStyle/>
+          <a:p>
+            <a:fld id="{B5025C0B-CE56-4DBD-9510-10912670B991}" type="slidenum">
+              <a:rPr lang="pt-BR" smtClean="0"/>
+              <a:t>1</a:t>
+            </a:fld>
+            <a:endParaRPr lang="pt-BR"/>
+          </a:p>
+        </p:txBody>
+      </p:sp>
+    </p:spTree>
+    <p:extLst>
+      <p:ext uri="{BB962C8B-B14F-4D97-AF65-F5344CB8AC3E}">
+        <p14:creationId xmlns:p14="http://schemas.microsoft.com/office/powerpoint/2010/main" val="2091683796"/>
+      </p:ext>
+    </p:extLst>
+  </p:cSld>
+  <p:clrMapOvr>
+    <a:masterClrMapping/>
+  </p:clrMapOvr>
+</p:notes>
+</file>
+
 <file path=ppt/slideLayouts/slideLayout1.xml><?xml version="1.0" encoding="utf-8"?>
 <p:sldLayout xmlns:a="http://schemas.openxmlformats.org/drawingml/2006/main" xmlns:r="http://schemas.openxmlformats.org/officeDocument/2006/relationships" xmlns:p="http://schemas.openxmlformats.org/presentationml/2006/main" type="title" preserve="1">
   <p:cSld name="Slide de Título">
@@ -263,7 +700,7 @@
           <a:p>
             <a:fld id="{6DDF8DC9-260B-4C78-A86F-57C58C36826C}" type="datetimeFigureOut">
               <a:rPr lang="pt-BR" smtClean="0"/>
-              <a:t>12/06/2022</a:t>
+              <a:t>14/06/2022</a:t>
             </a:fld>
             <a:endParaRPr lang="pt-BR" dirty="0"/>
           </a:p>
@@ -461,7 +898,7 @@
           <a:p>
             <a:fld id="{6DDF8DC9-260B-4C78-A86F-57C58C36826C}" type="datetimeFigureOut">
               <a:rPr lang="pt-BR" smtClean="0"/>
-              <a:t>12/06/2022</a:t>
+              <a:t>14/06/2022</a:t>
             </a:fld>
             <a:endParaRPr lang="pt-BR" dirty="0"/>
           </a:p>
@@ -669,7 +1106,7 @@
           <a:p>
             <a:fld id="{6DDF8DC9-260B-4C78-A86F-57C58C36826C}" type="datetimeFigureOut">
               <a:rPr lang="pt-BR" smtClean="0"/>
-              <a:t>12/06/2022</a:t>
+              <a:t>14/06/2022</a:t>
             </a:fld>
             <a:endParaRPr lang="pt-BR" dirty="0"/>
           </a:p>
@@ -867,7 +1304,7 @@
           <a:p>
             <a:fld id="{6DDF8DC9-260B-4C78-A86F-57C58C36826C}" type="datetimeFigureOut">
               <a:rPr lang="pt-BR" smtClean="0"/>
-              <a:t>12/06/2022</a:t>
+              <a:t>14/06/2022</a:t>
             </a:fld>
             <a:endParaRPr lang="pt-BR" dirty="0"/>
           </a:p>
@@ -1142,7 +1579,7 @@
           <a:p>
             <a:fld id="{6DDF8DC9-260B-4C78-A86F-57C58C36826C}" type="datetimeFigureOut">
               <a:rPr lang="pt-BR" smtClean="0"/>
-              <a:t>12/06/2022</a:t>
+              <a:t>14/06/2022</a:t>
             </a:fld>
             <a:endParaRPr lang="pt-BR" dirty="0"/>
           </a:p>
@@ -1407,7 +1844,7 @@
           <a:p>
             <a:fld id="{6DDF8DC9-260B-4C78-A86F-57C58C36826C}" type="datetimeFigureOut">
               <a:rPr lang="pt-BR" smtClean="0"/>
-              <a:t>12/06/2022</a:t>
+              <a:t>14/06/2022</a:t>
             </a:fld>
             <a:endParaRPr lang="pt-BR" dirty="0"/>
           </a:p>
@@ -1819,7 +2256,7 @@
           <a:p>
             <a:fld id="{6DDF8DC9-260B-4C78-A86F-57C58C36826C}" type="datetimeFigureOut">
               <a:rPr lang="pt-BR" smtClean="0"/>
-              <a:t>12/06/2022</a:t>
+              <a:t>14/06/2022</a:t>
             </a:fld>
             <a:endParaRPr lang="pt-BR" dirty="0"/>
           </a:p>
@@ -1960,7 +2397,7 @@
           <a:p>
             <a:fld id="{6DDF8DC9-260B-4C78-A86F-57C58C36826C}" type="datetimeFigureOut">
               <a:rPr lang="pt-BR" smtClean="0"/>
-              <a:t>12/06/2022</a:t>
+              <a:t>14/06/2022</a:t>
             </a:fld>
             <a:endParaRPr lang="pt-BR" dirty="0"/>
           </a:p>
@@ -2073,7 +2510,7 @@
           <a:p>
             <a:fld id="{6DDF8DC9-260B-4C78-A86F-57C58C36826C}" type="datetimeFigureOut">
               <a:rPr lang="pt-BR" smtClean="0"/>
-              <a:t>12/06/2022</a:t>
+              <a:t>14/06/2022</a:t>
             </a:fld>
             <a:endParaRPr lang="pt-BR" dirty="0"/>
           </a:p>
@@ -2384,7 +2821,7 @@
           <a:p>
             <a:fld id="{6DDF8DC9-260B-4C78-A86F-57C58C36826C}" type="datetimeFigureOut">
               <a:rPr lang="pt-BR" smtClean="0"/>
-              <a:t>12/06/2022</a:t>
+              <a:t>14/06/2022</a:t>
             </a:fld>
             <a:endParaRPr lang="pt-BR" dirty="0"/>
           </a:p>
@@ -2672,7 +3109,7 @@
           <a:p>
             <a:fld id="{6DDF8DC9-260B-4C78-A86F-57C58C36826C}" type="datetimeFigureOut">
               <a:rPr lang="pt-BR" smtClean="0"/>
-              <a:t>12/06/2022</a:t>
+              <a:t>14/06/2022</a:t>
             </a:fld>
             <a:endParaRPr lang="pt-BR" dirty="0"/>
           </a:p>
@@ -2913,7 +3350,7 @@
           <a:p>
             <a:fld id="{6DDF8DC9-260B-4C78-A86F-57C58C36826C}" type="datetimeFigureOut">
               <a:rPr lang="pt-BR" smtClean="0"/>
-              <a:t>12/06/2022</a:t>
+              <a:t>14/06/2022</a:t>
             </a:fld>
             <a:endParaRPr lang="pt-BR" dirty="0"/>
           </a:p>
@@ -3636,7 +4073,7 @@
         </p:nvSpPr>
         <p:spPr>
           <a:xfrm>
-            <a:off x="169331" y="4905022"/>
+            <a:off x="169331" y="5494864"/>
             <a:ext cx="3251200" cy="434622"/>
           </a:xfrm>
           <a:prstGeom prst="rect">
@@ -3686,6 +4123,56 @@
         </p:nvSpPr>
         <p:spPr>
           <a:xfrm>
+            <a:off x="8771471" y="809978"/>
+            <a:ext cx="3251200" cy="434622"/>
+          </a:xfrm>
+          <a:prstGeom prst="rect">
+            <a:avLst/>
+          </a:prstGeom>
+        </p:spPr>
+        <p:style>
+          <a:lnRef idx="2">
+            <a:schemeClr val="accent6"/>
+          </a:lnRef>
+          <a:fillRef idx="1">
+            <a:schemeClr val="lt1"/>
+          </a:fillRef>
+          <a:effectRef idx="0">
+            <a:schemeClr val="accent6"/>
+          </a:effectRef>
+          <a:fontRef idx="minor">
+            <a:schemeClr val="dk1"/>
+          </a:fontRef>
+        </p:style>
+        <p:txBody>
+          <a:bodyPr rtlCol="0" anchor="ctr"/>
+          <a:lstStyle/>
+          <a:p>
+            <a:r>
+              <a:rPr lang="pt-BR" dirty="0" err="1"/>
+              <a:t>buscaPorId</a:t>
+            </a:r>
+            <a:r>
+              <a:rPr lang="pt-BR" dirty="0"/>
+              <a:t>();</a:t>
+            </a:r>
+          </a:p>
+        </p:txBody>
+      </p:sp>
+      <p:sp>
+        <p:nvSpPr>
+          <p:cNvPr id="13" name="Retângulo 12">
+            <a:extLst>
+              <a:ext uri="{FF2B5EF4-FFF2-40B4-BE49-F238E27FC236}">
+                <a16:creationId xmlns:a16="http://schemas.microsoft.com/office/drawing/2014/main" id="{18A244E5-1DDD-9264-5E2D-B71D9EEDF8E3}"/>
+              </a:ext>
+            </a:extLst>
+          </p:cNvPr>
+          <p:cNvSpPr/>
+          <p:nvPr/>
+        </p:nvSpPr>
+        <p:spPr>
+          <a:xfrm>
             <a:off x="169331" y="6067776"/>
             <a:ext cx="3251200" cy="434622"/>
           </a:xfrm>
@@ -3713,7 +4200,7 @@
           <a:p>
             <a:r>
               <a:rPr lang="pt-BR" dirty="0" err="1"/>
-              <a:t>buscaPorId</a:t>
+              <a:t>carregaDadosPerfil</a:t>
             </a:r>
             <a:r>
               <a:rPr lang="pt-BR" dirty="0"/>
@@ -3724,56 +4211,6 @@
       </p:sp>
       <p:sp>
         <p:nvSpPr>
-          <p:cNvPr id="13" name="Retângulo 12">
-            <a:extLst>
-              <a:ext uri="{FF2B5EF4-FFF2-40B4-BE49-F238E27FC236}">
-                <a16:creationId xmlns:a16="http://schemas.microsoft.com/office/drawing/2014/main" id="{18A244E5-1DDD-9264-5E2D-B71D9EEDF8E3}"/>
-              </a:ext>
-            </a:extLst>
-          </p:cNvPr>
-          <p:cNvSpPr/>
-          <p:nvPr/>
-        </p:nvSpPr>
-        <p:spPr>
-          <a:xfrm>
-            <a:off x="169331" y="5477934"/>
-            <a:ext cx="3251200" cy="434622"/>
-          </a:xfrm>
-          <a:prstGeom prst="rect">
-            <a:avLst/>
-          </a:prstGeom>
-        </p:spPr>
-        <p:style>
-          <a:lnRef idx="2">
-            <a:schemeClr val="accent6"/>
-          </a:lnRef>
-          <a:fillRef idx="1">
-            <a:schemeClr val="lt1"/>
-          </a:fillRef>
-          <a:effectRef idx="0">
-            <a:schemeClr val="accent6"/>
-          </a:effectRef>
-          <a:fontRef idx="minor">
-            <a:schemeClr val="dk1"/>
-          </a:fontRef>
-        </p:style>
-        <p:txBody>
-          <a:bodyPr rtlCol="0" anchor="ctr"/>
-          <a:lstStyle/>
-          <a:p>
-            <a:r>
-              <a:rPr lang="pt-BR" dirty="0" err="1"/>
-              <a:t>carregaDadosPerfil</a:t>
-            </a:r>
-            <a:r>
-              <a:rPr lang="pt-BR" dirty="0"/>
-              <a:t>();</a:t>
-            </a:r>
-          </a:p>
-        </p:txBody>
-      </p:sp>
-      <p:sp>
-        <p:nvSpPr>
           <p:cNvPr id="14" name="Retângulo 13">
             <a:extLst>
               <a:ext uri="{FF2B5EF4-FFF2-40B4-BE49-F238E27FC236}">
@@ -3786,7 +4223,7 @@
         </p:nvSpPr>
         <p:spPr>
           <a:xfrm>
-            <a:off x="8748889" y="824089"/>
+            <a:off x="8737600" y="1969910"/>
             <a:ext cx="3251200" cy="434622"/>
           </a:xfrm>
           <a:prstGeom prst="rect">
@@ -3836,7 +4273,7 @@
         </p:nvSpPr>
         <p:spPr>
           <a:xfrm>
-            <a:off x="8748889" y="1411111"/>
+            <a:off x="8737600" y="2556932"/>
             <a:ext cx="3251200" cy="434622"/>
           </a:xfrm>
           <a:prstGeom prst="rect">
@@ -3886,7 +4323,7 @@
         </p:nvSpPr>
         <p:spPr>
           <a:xfrm>
-            <a:off x="8748889" y="1998133"/>
+            <a:off x="8737600" y="3143954"/>
             <a:ext cx="3251200" cy="434622"/>
           </a:xfrm>
           <a:prstGeom prst="rect">
@@ -3936,7 +4373,7 @@
         </p:nvSpPr>
         <p:spPr>
           <a:xfrm>
-            <a:off x="8748889" y="2585155"/>
+            <a:off x="8748889" y="4320814"/>
             <a:ext cx="3251200" cy="434622"/>
           </a:xfrm>
           <a:prstGeom prst="rect">
@@ -4038,7 +4475,7 @@
         </p:nvSpPr>
         <p:spPr>
           <a:xfrm>
-            <a:off x="3527774" y="5486398"/>
+            <a:off x="3527774" y="6076240"/>
             <a:ext cx="2404534" cy="434622"/>
           </a:xfrm>
           <a:prstGeom prst="rect">
@@ -4142,7 +4579,7 @@
         </p:nvSpPr>
         <p:spPr>
           <a:xfrm>
-            <a:off x="6248401" y="818445"/>
+            <a:off x="6237112" y="1964266"/>
             <a:ext cx="2404534" cy="434622"/>
           </a:xfrm>
           <a:prstGeom prst="rect">
@@ -4197,7 +4634,7 @@
         </p:nvSpPr>
         <p:spPr>
           <a:xfrm>
-            <a:off x="6248401" y="1411111"/>
+            <a:off x="6237112" y="2556932"/>
             <a:ext cx="2404534" cy="434622"/>
           </a:xfrm>
           <a:prstGeom prst="rect">
@@ -4252,7 +4689,7 @@
         </p:nvSpPr>
         <p:spPr>
           <a:xfrm>
-            <a:off x="6248400" y="1998133"/>
+            <a:off x="6237111" y="3143954"/>
             <a:ext cx="2404534" cy="434622"/>
           </a:xfrm>
           <a:prstGeom prst="rect">
@@ -4359,7 +4796,7 @@
         </p:nvSpPr>
         <p:spPr>
           <a:xfrm>
-            <a:off x="6248400" y="2590799"/>
+            <a:off x="6248400" y="4326458"/>
             <a:ext cx="2404534" cy="434622"/>
           </a:xfrm>
           <a:prstGeom prst="rect">
@@ -4515,7 +4952,7 @@
         </p:nvSpPr>
         <p:spPr>
           <a:xfrm>
-            <a:off x="3516485" y="4910666"/>
+            <a:off x="3516485" y="5500508"/>
             <a:ext cx="2427113" cy="434622"/>
           </a:xfrm>
           <a:prstGeom prst="rect">
@@ -4569,7 +5006,7 @@
         </p:nvSpPr>
         <p:spPr>
           <a:xfrm>
-            <a:off x="3527774" y="6067776"/>
+            <a:off x="6248400" y="815631"/>
             <a:ext cx="2427113" cy="434622"/>
           </a:xfrm>
           <a:prstGeom prst="rect">
@@ -4807,6 +5244,695 @@
             <a:r>
               <a:rPr lang="pt-BR" dirty="0"/>
               <a:t>login</a:t>
+            </a:r>
+          </a:p>
+        </p:txBody>
+      </p:sp>
+      <p:sp>
+        <p:nvSpPr>
+          <p:cNvPr id="47" name="Retângulo 46">
+            <a:extLst>
+              <a:ext uri="{FF2B5EF4-FFF2-40B4-BE49-F238E27FC236}">
+                <a16:creationId xmlns:a16="http://schemas.microsoft.com/office/drawing/2014/main" id="{18BE38CC-BD81-80D6-A013-F93B9C5C05FA}"/>
+              </a:ext>
+            </a:extLst>
+          </p:cNvPr>
+          <p:cNvSpPr/>
+          <p:nvPr/>
+        </p:nvSpPr>
+        <p:spPr>
+          <a:xfrm>
+            <a:off x="6225822" y="4902192"/>
+            <a:ext cx="2404534" cy="434622"/>
+          </a:xfrm>
+          <a:prstGeom prst="rect">
+            <a:avLst/>
+          </a:prstGeom>
+          <a:ln>
+            <a:solidFill>
+              <a:schemeClr val="accent1">
+                <a:lumMod val="40000"/>
+                <a:lumOff val="60000"/>
+              </a:schemeClr>
+            </a:solidFill>
+          </a:ln>
+        </p:spPr>
+        <p:style>
+          <a:lnRef idx="2">
+            <a:schemeClr val="accent3"/>
+          </a:lnRef>
+          <a:fillRef idx="1">
+            <a:schemeClr val="lt1"/>
+          </a:fillRef>
+          <a:effectRef idx="0">
+            <a:schemeClr val="accent3"/>
+          </a:effectRef>
+          <a:fontRef idx="minor">
+            <a:schemeClr val="dk1"/>
+          </a:fontRef>
+        </p:style>
+        <p:txBody>
+          <a:bodyPr rtlCol="0" anchor="ctr"/>
+          <a:lstStyle/>
+          <a:p>
+            <a:pPr algn="ctr"/>
+            <a:r>
+              <a:rPr lang="pt-BR" dirty="0"/>
+              <a:t>Notificação</a:t>
+            </a:r>
+          </a:p>
+        </p:txBody>
+      </p:sp>
+      <p:sp>
+        <p:nvSpPr>
+          <p:cNvPr id="48" name="Retângulo 47">
+            <a:extLst>
+              <a:ext uri="{FF2B5EF4-FFF2-40B4-BE49-F238E27FC236}">
+                <a16:creationId xmlns:a16="http://schemas.microsoft.com/office/drawing/2014/main" id="{324DF8BD-206F-CBDF-A50C-DD76BB23A7FB}"/>
+              </a:ext>
+            </a:extLst>
+          </p:cNvPr>
+          <p:cNvSpPr/>
+          <p:nvPr/>
+        </p:nvSpPr>
+        <p:spPr>
+          <a:xfrm>
+            <a:off x="8771471" y="4910666"/>
+            <a:ext cx="3251200" cy="434622"/>
+          </a:xfrm>
+          <a:prstGeom prst="rect">
+            <a:avLst/>
+          </a:prstGeom>
+          <a:solidFill>
+            <a:schemeClr val="accent5">
+              <a:lumMod val="20000"/>
+              <a:lumOff val="80000"/>
+            </a:schemeClr>
+          </a:solidFill>
+          <a:ln>
+            <a:solidFill>
+              <a:schemeClr val="accent1">
+                <a:lumMod val="75000"/>
+              </a:schemeClr>
+            </a:solidFill>
+          </a:ln>
+        </p:spPr>
+        <p:style>
+          <a:lnRef idx="2">
+            <a:schemeClr val="accent6"/>
+          </a:lnRef>
+          <a:fillRef idx="1">
+            <a:schemeClr val="lt1"/>
+          </a:fillRef>
+          <a:effectRef idx="0">
+            <a:schemeClr val="accent6"/>
+          </a:effectRef>
+          <a:fontRef idx="minor">
+            <a:schemeClr val="dk1"/>
+          </a:fontRef>
+        </p:style>
+        <p:txBody>
+          <a:bodyPr rtlCol="0" anchor="ctr"/>
+          <a:lstStyle/>
+          <a:p>
+            <a:r>
+              <a:rPr lang="pt-BR" dirty="0" err="1"/>
+              <a:t>BuscaEmail</a:t>
+            </a:r>
+            <a:r>
+              <a:rPr lang="pt-BR" dirty="0"/>
+              <a:t>();</a:t>
+            </a:r>
+          </a:p>
+        </p:txBody>
+      </p:sp>
+      <p:sp>
+        <p:nvSpPr>
+          <p:cNvPr id="49" name="Retângulo 48">
+            <a:extLst>
+              <a:ext uri="{FF2B5EF4-FFF2-40B4-BE49-F238E27FC236}">
+                <a16:creationId xmlns:a16="http://schemas.microsoft.com/office/drawing/2014/main" id="{B2876D30-C4BA-567B-5CC1-C0D43E3F01EB}"/>
+              </a:ext>
+            </a:extLst>
+          </p:cNvPr>
+          <p:cNvSpPr/>
+          <p:nvPr/>
+        </p:nvSpPr>
+        <p:spPr>
+          <a:xfrm>
+            <a:off x="8748889" y="5472285"/>
+            <a:ext cx="3251200" cy="434622"/>
+          </a:xfrm>
+          <a:prstGeom prst="rect">
+            <a:avLst/>
+          </a:prstGeom>
+          <a:solidFill>
+            <a:schemeClr val="accent5">
+              <a:lumMod val="20000"/>
+              <a:lumOff val="80000"/>
+            </a:schemeClr>
+          </a:solidFill>
+          <a:ln>
+            <a:solidFill>
+              <a:schemeClr val="accent1">
+                <a:lumMod val="75000"/>
+              </a:schemeClr>
+            </a:solidFill>
+          </a:ln>
+        </p:spPr>
+        <p:style>
+          <a:lnRef idx="2">
+            <a:schemeClr val="accent6"/>
+          </a:lnRef>
+          <a:fillRef idx="1">
+            <a:schemeClr val="lt1"/>
+          </a:fillRef>
+          <a:effectRef idx="0">
+            <a:schemeClr val="accent6"/>
+          </a:effectRef>
+          <a:fontRef idx="minor">
+            <a:schemeClr val="dk1"/>
+          </a:fontRef>
+        </p:style>
+        <p:txBody>
+          <a:bodyPr rtlCol="0" anchor="ctr"/>
+          <a:lstStyle/>
+          <a:p>
+            <a:r>
+              <a:rPr lang="pt-BR" dirty="0" err="1"/>
+              <a:t>BuscaTipoNotificacao</a:t>
+            </a:r>
+            <a:r>
+              <a:rPr lang="pt-BR" dirty="0"/>
+              <a:t>();</a:t>
+            </a:r>
+          </a:p>
+        </p:txBody>
+      </p:sp>
+      <p:sp>
+        <p:nvSpPr>
+          <p:cNvPr id="50" name="Retângulo 49">
+            <a:extLst>
+              <a:ext uri="{FF2B5EF4-FFF2-40B4-BE49-F238E27FC236}">
+                <a16:creationId xmlns:a16="http://schemas.microsoft.com/office/drawing/2014/main" id="{2599BDAD-28DA-F38B-EAC7-004A37248CEC}"/>
+              </a:ext>
+            </a:extLst>
+          </p:cNvPr>
+          <p:cNvSpPr/>
+          <p:nvPr/>
+        </p:nvSpPr>
+        <p:spPr>
+          <a:xfrm>
+            <a:off x="8748889" y="6067776"/>
+            <a:ext cx="3251200" cy="434622"/>
+          </a:xfrm>
+          <a:prstGeom prst="rect">
+            <a:avLst/>
+          </a:prstGeom>
+          <a:solidFill>
+            <a:schemeClr val="accent5">
+              <a:lumMod val="20000"/>
+              <a:lumOff val="80000"/>
+            </a:schemeClr>
+          </a:solidFill>
+          <a:ln>
+            <a:solidFill>
+              <a:schemeClr val="accent1">
+                <a:lumMod val="75000"/>
+              </a:schemeClr>
+            </a:solidFill>
+          </a:ln>
+        </p:spPr>
+        <p:style>
+          <a:lnRef idx="2">
+            <a:schemeClr val="accent6"/>
+          </a:lnRef>
+          <a:fillRef idx="1">
+            <a:schemeClr val="lt1"/>
+          </a:fillRef>
+          <a:effectRef idx="0">
+            <a:schemeClr val="accent6"/>
+          </a:effectRef>
+          <a:fontRef idx="minor">
+            <a:schemeClr val="dk1"/>
+          </a:fontRef>
+        </p:style>
+        <p:txBody>
+          <a:bodyPr rtlCol="0" anchor="ctr"/>
+          <a:lstStyle/>
+          <a:p>
+            <a:r>
+              <a:rPr lang="pt-BR" dirty="0" err="1"/>
+              <a:t>listaTipoNotificacao</a:t>
+            </a:r>
+            <a:r>
+              <a:rPr lang="pt-BR" dirty="0"/>
+              <a:t>();</a:t>
+            </a:r>
+          </a:p>
+        </p:txBody>
+      </p:sp>
+      <p:sp>
+        <p:nvSpPr>
+          <p:cNvPr id="51" name="Retângulo 50">
+            <a:extLst>
+              <a:ext uri="{FF2B5EF4-FFF2-40B4-BE49-F238E27FC236}">
+                <a16:creationId xmlns:a16="http://schemas.microsoft.com/office/drawing/2014/main" id="{C69696F2-5B54-73FD-3ED7-522D2E8F7A5B}"/>
+              </a:ext>
+            </a:extLst>
+          </p:cNvPr>
+          <p:cNvSpPr/>
+          <p:nvPr/>
+        </p:nvSpPr>
+        <p:spPr>
+          <a:xfrm>
+            <a:off x="6237111" y="5486387"/>
+            <a:ext cx="2404534" cy="434622"/>
+          </a:xfrm>
+          <a:prstGeom prst="rect">
+            <a:avLst/>
+          </a:prstGeom>
+          <a:ln>
+            <a:solidFill>
+              <a:schemeClr val="accent1">
+                <a:lumMod val="40000"/>
+                <a:lumOff val="60000"/>
+              </a:schemeClr>
+            </a:solidFill>
+          </a:ln>
+        </p:spPr>
+        <p:style>
+          <a:lnRef idx="2">
+            <a:schemeClr val="accent3"/>
+          </a:lnRef>
+          <a:fillRef idx="1">
+            <a:schemeClr val="lt1"/>
+          </a:fillRef>
+          <a:effectRef idx="0">
+            <a:schemeClr val="accent3"/>
+          </a:effectRef>
+          <a:fontRef idx="minor">
+            <a:schemeClr val="dk1"/>
+          </a:fontRef>
+        </p:style>
+        <p:txBody>
+          <a:bodyPr rtlCol="0" anchor="ctr"/>
+          <a:lstStyle/>
+          <a:p>
+            <a:pPr algn="ctr"/>
+            <a:r>
+              <a:rPr lang="pt-BR" dirty="0"/>
+              <a:t>Notificação</a:t>
+            </a:r>
+          </a:p>
+        </p:txBody>
+      </p:sp>
+      <p:sp>
+        <p:nvSpPr>
+          <p:cNvPr id="52" name="Retângulo 51">
+            <a:extLst>
+              <a:ext uri="{FF2B5EF4-FFF2-40B4-BE49-F238E27FC236}">
+                <a16:creationId xmlns:a16="http://schemas.microsoft.com/office/drawing/2014/main" id="{578F5C12-BBFD-F711-6B06-AB244BEE0A78}"/>
+              </a:ext>
+            </a:extLst>
+          </p:cNvPr>
+          <p:cNvSpPr/>
+          <p:nvPr/>
+        </p:nvSpPr>
+        <p:spPr>
+          <a:xfrm>
+            <a:off x="6248400" y="6076234"/>
+            <a:ext cx="2404534" cy="434622"/>
+          </a:xfrm>
+          <a:prstGeom prst="rect">
+            <a:avLst/>
+          </a:prstGeom>
+          <a:ln>
+            <a:solidFill>
+              <a:schemeClr val="accent1">
+                <a:lumMod val="40000"/>
+                <a:lumOff val="60000"/>
+              </a:schemeClr>
+            </a:solidFill>
+          </a:ln>
+        </p:spPr>
+        <p:style>
+          <a:lnRef idx="2">
+            <a:schemeClr val="accent3"/>
+          </a:lnRef>
+          <a:fillRef idx="1">
+            <a:schemeClr val="lt1"/>
+          </a:fillRef>
+          <a:effectRef idx="0">
+            <a:schemeClr val="accent3"/>
+          </a:effectRef>
+          <a:fontRef idx="minor">
+            <a:schemeClr val="dk1"/>
+          </a:fontRef>
+        </p:style>
+        <p:txBody>
+          <a:bodyPr rtlCol="0" anchor="ctr"/>
+          <a:lstStyle/>
+          <a:p>
+            <a:pPr algn="ctr"/>
+            <a:r>
+              <a:rPr lang="pt-BR" dirty="0"/>
+              <a:t>Notificação</a:t>
+            </a:r>
+          </a:p>
+        </p:txBody>
+      </p:sp>
+      <p:sp>
+        <p:nvSpPr>
+          <p:cNvPr id="53" name="Retângulo 52">
+            <a:extLst>
+              <a:ext uri="{FF2B5EF4-FFF2-40B4-BE49-F238E27FC236}">
+                <a16:creationId xmlns:a16="http://schemas.microsoft.com/office/drawing/2014/main" id="{E2582A8E-00A6-844A-B70F-71FF22174481}"/>
+              </a:ext>
+            </a:extLst>
+          </p:cNvPr>
+          <p:cNvSpPr/>
+          <p:nvPr/>
+        </p:nvSpPr>
+        <p:spPr>
+          <a:xfrm>
+            <a:off x="169331" y="4907842"/>
+            <a:ext cx="3251200" cy="434622"/>
+          </a:xfrm>
+          <a:prstGeom prst="rect">
+            <a:avLst/>
+          </a:prstGeom>
+        </p:spPr>
+        <p:style>
+          <a:lnRef idx="2">
+            <a:schemeClr val="accent6"/>
+          </a:lnRef>
+          <a:fillRef idx="1">
+            <a:schemeClr val="lt1"/>
+          </a:fillRef>
+          <a:effectRef idx="0">
+            <a:schemeClr val="accent6"/>
+          </a:effectRef>
+          <a:fontRef idx="minor">
+            <a:schemeClr val="dk1"/>
+          </a:fontRef>
+        </p:style>
+        <p:txBody>
+          <a:bodyPr rtlCol="0" anchor="ctr"/>
+          <a:lstStyle/>
+          <a:p>
+            <a:r>
+              <a:rPr lang="pt-BR" dirty="0" err="1"/>
+              <a:t>verificaDadosPerfil</a:t>
+            </a:r>
+            <a:r>
+              <a:rPr lang="pt-BR" dirty="0"/>
+              <a:t>();</a:t>
+            </a:r>
+          </a:p>
+        </p:txBody>
+      </p:sp>
+      <p:sp>
+        <p:nvSpPr>
+          <p:cNvPr id="54" name="Retângulo 53">
+            <a:extLst>
+              <a:ext uri="{FF2B5EF4-FFF2-40B4-BE49-F238E27FC236}">
+                <a16:creationId xmlns:a16="http://schemas.microsoft.com/office/drawing/2014/main" id="{CE594A40-3973-F08E-B5B8-5A7E3B377330}"/>
+              </a:ext>
+            </a:extLst>
+          </p:cNvPr>
+          <p:cNvSpPr/>
+          <p:nvPr/>
+        </p:nvSpPr>
+        <p:spPr>
+          <a:xfrm>
+            <a:off x="3505194" y="4907842"/>
+            <a:ext cx="2427113" cy="434622"/>
+          </a:xfrm>
+          <a:prstGeom prst="rect">
+            <a:avLst/>
+          </a:prstGeom>
+          <a:ln>
+            <a:solidFill>
+              <a:srgbClr val="FF0000"/>
+            </a:solidFill>
+          </a:ln>
+        </p:spPr>
+        <p:style>
+          <a:lnRef idx="2">
+            <a:schemeClr val="accent3"/>
+          </a:lnRef>
+          <a:fillRef idx="1">
+            <a:schemeClr val="lt1"/>
+          </a:fillRef>
+          <a:effectRef idx="0">
+            <a:schemeClr val="accent3"/>
+          </a:effectRef>
+          <a:fontRef idx="minor">
+            <a:schemeClr val="dk1"/>
+          </a:fontRef>
+        </p:style>
+        <p:txBody>
+          <a:bodyPr rtlCol="0" anchor="ctr"/>
+          <a:lstStyle/>
+          <a:p>
+            <a:pPr algn="ctr"/>
+            <a:r>
+              <a:rPr lang="pt-BR" dirty="0"/>
+              <a:t>Verificação</a:t>
+            </a:r>
+          </a:p>
+        </p:txBody>
+      </p:sp>
+      <p:sp>
+        <p:nvSpPr>
+          <p:cNvPr id="55" name="Retângulo 54">
+            <a:extLst>
+              <a:ext uri="{FF2B5EF4-FFF2-40B4-BE49-F238E27FC236}">
+                <a16:creationId xmlns:a16="http://schemas.microsoft.com/office/drawing/2014/main" id="{BE09447C-A237-394C-B133-ACCD57E5E1C0}"/>
+              </a:ext>
+            </a:extLst>
+          </p:cNvPr>
+          <p:cNvSpPr/>
+          <p:nvPr/>
+        </p:nvSpPr>
+        <p:spPr>
+          <a:xfrm>
+            <a:off x="8771468" y="1382888"/>
+            <a:ext cx="3251200" cy="434622"/>
+          </a:xfrm>
+          <a:prstGeom prst="rect">
+            <a:avLst/>
+          </a:prstGeom>
+          <a:solidFill>
+            <a:schemeClr val="accent5">
+              <a:lumMod val="20000"/>
+              <a:lumOff val="80000"/>
+            </a:schemeClr>
+          </a:solidFill>
+          <a:ln>
+            <a:solidFill>
+              <a:schemeClr val="accent1">
+                <a:lumMod val="75000"/>
+              </a:schemeClr>
+            </a:solidFill>
+          </a:ln>
+        </p:spPr>
+        <p:style>
+          <a:lnRef idx="2">
+            <a:schemeClr val="accent6"/>
+          </a:lnRef>
+          <a:fillRef idx="1">
+            <a:schemeClr val="lt1"/>
+          </a:fillRef>
+          <a:effectRef idx="0">
+            <a:schemeClr val="accent6"/>
+          </a:effectRef>
+          <a:fontRef idx="minor">
+            <a:schemeClr val="dk1"/>
+          </a:fontRef>
+        </p:style>
+        <p:txBody>
+          <a:bodyPr rtlCol="0" anchor="ctr"/>
+          <a:lstStyle/>
+          <a:p>
+            <a:r>
+              <a:rPr lang="pt-BR" dirty="0" err="1"/>
+              <a:t>carregaDadosPerfil</a:t>
+            </a:r>
+            <a:r>
+              <a:rPr lang="pt-BR" dirty="0"/>
+              <a:t>();</a:t>
+            </a:r>
+          </a:p>
+        </p:txBody>
+      </p:sp>
+      <p:sp>
+        <p:nvSpPr>
+          <p:cNvPr id="56" name="Retângulo 55">
+            <a:extLst>
+              <a:ext uri="{FF2B5EF4-FFF2-40B4-BE49-F238E27FC236}">
+                <a16:creationId xmlns:a16="http://schemas.microsoft.com/office/drawing/2014/main" id="{60AB28E5-0084-9324-87DB-DDADB2317592}"/>
+              </a:ext>
+            </a:extLst>
+          </p:cNvPr>
+          <p:cNvSpPr/>
+          <p:nvPr/>
+        </p:nvSpPr>
+        <p:spPr>
+          <a:xfrm>
+            <a:off x="6270979" y="1394178"/>
+            <a:ext cx="2404534" cy="434622"/>
+          </a:xfrm>
+          <a:prstGeom prst="rect">
+            <a:avLst/>
+          </a:prstGeom>
+          <a:ln>
+            <a:solidFill>
+              <a:srgbClr val="7030A0"/>
+            </a:solidFill>
+          </a:ln>
+        </p:spPr>
+        <p:style>
+          <a:lnRef idx="2">
+            <a:schemeClr val="accent3"/>
+          </a:lnRef>
+          <a:fillRef idx="1">
+            <a:schemeClr val="lt1"/>
+          </a:fillRef>
+          <a:effectRef idx="0">
+            <a:schemeClr val="accent3"/>
+          </a:effectRef>
+          <a:fontRef idx="minor">
+            <a:schemeClr val="dk1"/>
+          </a:fontRef>
+        </p:style>
+        <p:txBody>
+          <a:bodyPr rtlCol="0" anchor="ctr"/>
+          <a:lstStyle/>
+          <a:p>
+            <a:pPr algn="ctr"/>
+            <a:r>
+              <a:rPr lang="pt-BR" dirty="0"/>
+              <a:t>Busca/Alteração</a:t>
+            </a:r>
+          </a:p>
+        </p:txBody>
+      </p:sp>
+      <p:sp>
+        <p:nvSpPr>
+          <p:cNvPr id="57" name="Retângulo 56">
+            <a:extLst>
+              <a:ext uri="{FF2B5EF4-FFF2-40B4-BE49-F238E27FC236}">
+                <a16:creationId xmlns:a16="http://schemas.microsoft.com/office/drawing/2014/main" id="{753D115F-AE36-B969-C3E4-F317C14D7977}"/>
+              </a:ext>
+            </a:extLst>
+          </p:cNvPr>
+          <p:cNvSpPr/>
+          <p:nvPr/>
+        </p:nvSpPr>
+        <p:spPr>
+          <a:xfrm>
+            <a:off x="8760183" y="3739445"/>
+            <a:ext cx="3251200" cy="434622"/>
+          </a:xfrm>
+          <a:prstGeom prst="rect">
+            <a:avLst/>
+          </a:prstGeom>
+          <a:solidFill>
+            <a:schemeClr val="accent5">
+              <a:lumMod val="20000"/>
+              <a:lumOff val="80000"/>
+            </a:schemeClr>
+          </a:solidFill>
+          <a:ln>
+            <a:solidFill>
+              <a:schemeClr val="accent1">
+                <a:lumMod val="75000"/>
+              </a:schemeClr>
+            </a:solidFill>
+          </a:ln>
+        </p:spPr>
+        <p:style>
+          <a:lnRef idx="2">
+            <a:schemeClr val="accent6"/>
+          </a:lnRef>
+          <a:fillRef idx="1">
+            <a:schemeClr val="lt1"/>
+          </a:fillRef>
+          <a:effectRef idx="0">
+            <a:schemeClr val="accent6"/>
+          </a:effectRef>
+          <a:fontRef idx="minor">
+            <a:schemeClr val="dk1"/>
+          </a:fontRef>
+        </p:style>
+        <p:txBody>
+          <a:bodyPr rtlCol="0" anchor="ctr"/>
+          <a:lstStyle/>
+          <a:p>
+            <a:r>
+              <a:rPr lang="pt-BR" dirty="0" err="1"/>
+              <a:t>alteraDadoPerfil</a:t>
+            </a:r>
+            <a:r>
+              <a:rPr lang="pt-BR" dirty="0"/>
+              <a:t>();</a:t>
+            </a:r>
+          </a:p>
+        </p:txBody>
+      </p:sp>
+      <p:sp>
+        <p:nvSpPr>
+          <p:cNvPr id="58" name="Retângulo 57">
+            <a:extLst>
+              <a:ext uri="{FF2B5EF4-FFF2-40B4-BE49-F238E27FC236}">
+                <a16:creationId xmlns:a16="http://schemas.microsoft.com/office/drawing/2014/main" id="{2E6813FC-B634-FFAC-F1AC-FF1885CEEA91}"/>
+              </a:ext>
+            </a:extLst>
+          </p:cNvPr>
+          <p:cNvSpPr/>
+          <p:nvPr/>
+        </p:nvSpPr>
+        <p:spPr>
+          <a:xfrm>
+            <a:off x="6248400" y="3742253"/>
+            <a:ext cx="2404534" cy="434622"/>
+          </a:xfrm>
+          <a:prstGeom prst="rect">
+            <a:avLst/>
+          </a:prstGeom>
+          <a:ln>
+            <a:solidFill>
+              <a:schemeClr val="accent1">
+                <a:lumMod val="40000"/>
+                <a:lumOff val="60000"/>
+              </a:schemeClr>
+            </a:solidFill>
+          </a:ln>
+        </p:spPr>
+        <p:style>
+          <a:lnRef idx="2">
+            <a:schemeClr val="accent3"/>
+          </a:lnRef>
+          <a:fillRef idx="1">
+            <a:schemeClr val="lt1"/>
+          </a:fillRef>
+          <a:effectRef idx="0">
+            <a:schemeClr val="accent3"/>
+          </a:effectRef>
+          <a:fontRef idx="minor">
+            <a:schemeClr val="dk1"/>
+          </a:fontRef>
+        </p:style>
+        <p:txBody>
+          <a:bodyPr rtlCol="0" anchor="ctr"/>
+          <a:lstStyle/>
+          <a:p>
+            <a:pPr algn="ctr"/>
+            <a:r>
+              <a:rPr lang="pt-BR" dirty="0"/>
+              <a:t>Update</a:t>
             </a:r>
           </a:p>
         </p:txBody>
@@ -4882,26 +6008,26 @@
           <a:p>
             <a:r>
               <a:rPr lang="pt-BR" dirty="0"/>
-              <a:t> Visual</a:t>
-            </a:r>
-          </a:p>
-        </p:txBody>
-      </p:sp>
-      <p:sp>
-        <p:nvSpPr>
-          <p:cNvPr id="3" name="Retângulo 2">
-            <a:extLst>
-              <a:ext uri="{FF2B5EF4-FFF2-40B4-BE49-F238E27FC236}">
-                <a16:creationId xmlns:a16="http://schemas.microsoft.com/office/drawing/2014/main" id="{7B639197-2319-744D-6458-22D306079209}"/>
-              </a:ext>
-            </a:extLst>
-          </p:cNvPr>
-          <p:cNvSpPr/>
-          <p:nvPr/>
-        </p:nvSpPr>
-        <p:spPr>
-          <a:xfrm>
-            <a:off x="169333" y="807156"/>
+              <a:t> User</a:t>
+            </a:r>
+          </a:p>
+        </p:txBody>
+      </p:sp>
+      <p:sp>
+        <p:nvSpPr>
+          <p:cNvPr id="38" name="Retângulo 37">
+            <a:extLst>
+              <a:ext uri="{FF2B5EF4-FFF2-40B4-BE49-F238E27FC236}">
+                <a16:creationId xmlns:a16="http://schemas.microsoft.com/office/drawing/2014/main" id="{DD2B1FAB-8DA4-1261-8CB8-EF02A59B7F95}"/>
+              </a:ext>
+            </a:extLst>
+          </p:cNvPr>
+          <p:cNvSpPr/>
+          <p:nvPr/>
+        </p:nvSpPr>
+        <p:spPr>
+          <a:xfrm>
+            <a:off x="169332" y="818444"/>
             <a:ext cx="3251200" cy="434622"/>
           </a:xfrm>
           <a:prstGeom prst="rect">
@@ -4928,7 +6054,7 @@
           <a:p>
             <a:r>
               <a:rPr lang="pt-BR" dirty="0" err="1"/>
-              <a:t>calculaTempoDia</a:t>
+              <a:t>verificaNotificacoes</a:t>
             </a:r>
             <a:r>
               <a:rPr lang="pt-BR" dirty="0"/>
@@ -4939,69 +6065,19 @@
       </p:sp>
       <p:sp>
         <p:nvSpPr>
-          <p:cNvPr id="4" name="Retângulo 3">
-            <a:extLst>
-              <a:ext uri="{FF2B5EF4-FFF2-40B4-BE49-F238E27FC236}">
-                <a16:creationId xmlns:a16="http://schemas.microsoft.com/office/drawing/2014/main" id="{72D402CB-5970-5957-B782-9E23538E1DE1}"/>
-              </a:ext>
-            </a:extLst>
-          </p:cNvPr>
-          <p:cNvSpPr/>
-          <p:nvPr/>
-        </p:nvSpPr>
-        <p:spPr>
-          <a:xfrm>
-            <a:off x="169333" y="1992488"/>
-            <a:ext cx="3251200" cy="434622"/>
-          </a:xfrm>
-          <a:prstGeom prst="rect">
-            <a:avLst/>
-          </a:prstGeom>
-        </p:spPr>
-        <p:style>
-          <a:lnRef idx="2">
-            <a:schemeClr val="accent6"/>
-          </a:lnRef>
-          <a:fillRef idx="1">
-            <a:schemeClr val="lt1"/>
-          </a:fillRef>
-          <a:effectRef idx="0">
-            <a:schemeClr val="accent6"/>
-          </a:effectRef>
-          <a:fontRef idx="minor">
-            <a:schemeClr val="dk1"/>
-          </a:fontRef>
-        </p:style>
-        <p:txBody>
-          <a:bodyPr rtlCol="0" anchor="ctr"/>
-          <a:lstStyle/>
-          <a:p>
-            <a:r>
-              <a:rPr lang="pt-BR" dirty="0" err="1"/>
-              <a:t>listaUltimosLancamentos</a:t>
-            </a:r>
-            <a:r>
-              <a:rPr lang="pt-BR" dirty="0"/>
-              <a:t>();</a:t>
-            </a:r>
-          </a:p>
-        </p:txBody>
-      </p:sp>
-      <p:sp>
-        <p:nvSpPr>
-          <p:cNvPr id="18" name="Retângulo 17">
-            <a:extLst>
-              <a:ext uri="{FF2B5EF4-FFF2-40B4-BE49-F238E27FC236}">
-                <a16:creationId xmlns:a16="http://schemas.microsoft.com/office/drawing/2014/main" id="{2034A352-027D-CBE7-EC78-6ABBA0E8FD46}"/>
-              </a:ext>
-            </a:extLst>
-          </p:cNvPr>
-          <p:cNvSpPr/>
-          <p:nvPr/>
-        </p:nvSpPr>
-        <p:spPr>
-          <a:xfrm>
-            <a:off x="3516488" y="801512"/>
+          <p:cNvPr id="40" name="Retângulo 39">
+            <a:extLst>
+              <a:ext uri="{FF2B5EF4-FFF2-40B4-BE49-F238E27FC236}">
+                <a16:creationId xmlns:a16="http://schemas.microsoft.com/office/drawing/2014/main" id="{91C3BC12-22D0-5871-6922-0927EF9741D8}"/>
+              </a:ext>
+            </a:extLst>
+          </p:cNvPr>
+          <p:cNvSpPr/>
+          <p:nvPr/>
+        </p:nvSpPr>
+        <p:spPr>
+          <a:xfrm>
+            <a:off x="3516487" y="812800"/>
             <a:ext cx="2427113" cy="434622"/>
           </a:xfrm>
           <a:prstGeom prst="rect">
@@ -5009,7 +6085,10 @@
           </a:prstGeom>
           <a:ln>
             <a:solidFill>
-              <a:schemeClr val="accent2"/>
+              <a:schemeClr val="accent5">
+                <a:lumMod val="40000"/>
+                <a:lumOff val="60000"/>
+              </a:schemeClr>
             </a:solidFill>
           </a:ln>
         </p:spPr>
@@ -5034,272 +6113,7 @@
             <a:pPr algn="ctr"/>
             <a:r>
               <a:rPr lang="pt-BR" dirty="0"/>
-              <a:t>Calculo</a:t>
-            </a:r>
-          </a:p>
-        </p:txBody>
-      </p:sp>
-      <p:sp>
-        <p:nvSpPr>
-          <p:cNvPr id="19" name="Retângulo 18">
-            <a:extLst>
-              <a:ext uri="{FF2B5EF4-FFF2-40B4-BE49-F238E27FC236}">
-                <a16:creationId xmlns:a16="http://schemas.microsoft.com/office/drawing/2014/main" id="{3FAE3BB6-7EDE-0F45-86FC-DE4C8BD262CE}"/>
-              </a:ext>
-            </a:extLst>
-          </p:cNvPr>
-          <p:cNvSpPr/>
-          <p:nvPr/>
-        </p:nvSpPr>
-        <p:spPr>
-          <a:xfrm>
-            <a:off x="3516488" y="1981200"/>
-            <a:ext cx="2427113" cy="434622"/>
-          </a:xfrm>
-          <a:prstGeom prst="rect">
-            <a:avLst/>
-          </a:prstGeom>
-          <a:ln>
-            <a:solidFill>
-              <a:srgbClr val="00B0F0"/>
-            </a:solidFill>
-          </a:ln>
-        </p:spPr>
-        <p:style>
-          <a:lnRef idx="2">
-            <a:schemeClr val="accent3"/>
-          </a:lnRef>
-          <a:fillRef idx="1">
-            <a:schemeClr val="lt1"/>
-          </a:fillRef>
-          <a:effectRef idx="0">
-            <a:schemeClr val="accent3"/>
-          </a:effectRef>
-          <a:fontRef idx="minor">
-            <a:schemeClr val="dk1"/>
-          </a:fontRef>
-        </p:style>
-        <p:txBody>
-          <a:bodyPr rtlCol="0" anchor="ctr"/>
-          <a:lstStyle/>
-          <a:p>
-            <a:pPr algn="ctr"/>
-            <a:r>
-              <a:rPr lang="pt-BR" dirty="0"/>
-              <a:t>Listagem</a:t>
-            </a:r>
-          </a:p>
-        </p:txBody>
-      </p:sp>
-      <p:sp>
-        <p:nvSpPr>
-          <p:cNvPr id="21" name="Retângulo 20">
-            <a:extLst>
-              <a:ext uri="{FF2B5EF4-FFF2-40B4-BE49-F238E27FC236}">
-                <a16:creationId xmlns:a16="http://schemas.microsoft.com/office/drawing/2014/main" id="{8E6EB253-E1F5-D0CE-BA5C-3294D7B280ED}"/>
-              </a:ext>
-            </a:extLst>
-          </p:cNvPr>
-          <p:cNvSpPr/>
-          <p:nvPr/>
-        </p:nvSpPr>
-        <p:spPr>
-          <a:xfrm>
-            <a:off x="169333" y="2556934"/>
-            <a:ext cx="3251200" cy="434622"/>
-          </a:xfrm>
-          <a:prstGeom prst="rect">
-            <a:avLst/>
-          </a:prstGeom>
-        </p:spPr>
-        <p:style>
-          <a:lnRef idx="2">
-            <a:schemeClr val="accent6"/>
-          </a:lnRef>
-          <a:fillRef idx="1">
-            <a:schemeClr val="lt1"/>
-          </a:fillRef>
-          <a:effectRef idx="0">
-            <a:schemeClr val="accent6"/>
-          </a:effectRef>
-          <a:fontRef idx="minor">
-            <a:schemeClr val="dk1"/>
-          </a:fontRef>
-        </p:style>
-        <p:txBody>
-          <a:bodyPr rtlCol="0" anchor="ctr"/>
-          <a:lstStyle/>
-          <a:p>
-            <a:r>
-              <a:rPr lang="pt-BR" dirty="0" err="1">
-                <a:solidFill>
-                  <a:srgbClr val="FF0000"/>
-                </a:solidFill>
-              </a:rPr>
-              <a:t>mostraMensagem</a:t>
-            </a:r>
-            <a:r>
-              <a:rPr lang="pt-BR" dirty="0">
-                <a:solidFill>
-                  <a:srgbClr val="FF0000"/>
-                </a:solidFill>
-              </a:rPr>
-              <a:t>();</a:t>
-            </a:r>
-          </a:p>
-        </p:txBody>
-      </p:sp>
-      <p:sp>
-        <p:nvSpPr>
-          <p:cNvPr id="22" name="Retângulo 21">
-            <a:extLst>
-              <a:ext uri="{FF2B5EF4-FFF2-40B4-BE49-F238E27FC236}">
-                <a16:creationId xmlns:a16="http://schemas.microsoft.com/office/drawing/2014/main" id="{BA2D6CC1-B8E8-2826-9B1B-4D4834830788}"/>
-              </a:ext>
-            </a:extLst>
-          </p:cNvPr>
-          <p:cNvSpPr/>
-          <p:nvPr/>
-        </p:nvSpPr>
-        <p:spPr>
-          <a:xfrm>
-            <a:off x="3516488" y="2562578"/>
-            <a:ext cx="2427113" cy="434622"/>
-          </a:xfrm>
-          <a:prstGeom prst="rect">
-            <a:avLst/>
-          </a:prstGeom>
-          <a:noFill/>
-          <a:ln>
-            <a:solidFill>
-              <a:srgbClr val="7030A0"/>
-            </a:solidFill>
-          </a:ln>
-        </p:spPr>
-        <p:style>
-          <a:lnRef idx="2">
-            <a:schemeClr val="accent3"/>
-          </a:lnRef>
-          <a:fillRef idx="1">
-            <a:schemeClr val="lt1"/>
-          </a:fillRef>
-          <a:effectRef idx="0">
-            <a:schemeClr val="accent3"/>
-          </a:effectRef>
-          <a:fontRef idx="minor">
-            <a:schemeClr val="dk1"/>
-          </a:fontRef>
-        </p:style>
-        <p:txBody>
-          <a:bodyPr rtlCol="0" anchor="ctr"/>
-          <a:lstStyle/>
-          <a:p>
-            <a:pPr algn="ctr"/>
-            <a:r>
-              <a:rPr lang="pt-BR" dirty="0"/>
-              <a:t>Mensagem</a:t>
-            </a:r>
-          </a:p>
-        </p:txBody>
-      </p:sp>
-      <p:sp>
-        <p:nvSpPr>
-          <p:cNvPr id="23" name="Retângulo 22">
-            <a:extLst>
-              <a:ext uri="{FF2B5EF4-FFF2-40B4-BE49-F238E27FC236}">
-                <a16:creationId xmlns:a16="http://schemas.microsoft.com/office/drawing/2014/main" id="{01506A33-EF74-B4D6-07BD-531A273E7902}"/>
-              </a:ext>
-            </a:extLst>
-          </p:cNvPr>
-          <p:cNvSpPr/>
-          <p:nvPr/>
-        </p:nvSpPr>
-        <p:spPr>
-          <a:xfrm>
-            <a:off x="169333" y="1382890"/>
-            <a:ext cx="3251200" cy="434622"/>
-          </a:xfrm>
-          <a:prstGeom prst="rect">
-            <a:avLst/>
-          </a:prstGeom>
-        </p:spPr>
-        <p:style>
-          <a:lnRef idx="2">
-            <a:schemeClr val="accent6"/>
-          </a:lnRef>
-          <a:fillRef idx="1">
-            <a:schemeClr val="lt1"/>
-          </a:fillRef>
-          <a:effectRef idx="0">
-            <a:schemeClr val="accent6"/>
-          </a:effectRef>
-          <a:fontRef idx="minor">
-            <a:schemeClr val="dk1"/>
-          </a:fontRef>
-        </p:style>
-        <p:txBody>
-          <a:bodyPr rtlCol="0" anchor="ctr"/>
-          <a:lstStyle/>
-          <a:p>
-            <a:r>
-              <a:rPr lang="pt-BR" dirty="0" err="1"/>
-              <a:t>setCorLancamento</a:t>
-            </a:r>
-            <a:r>
-              <a:rPr lang="pt-BR" dirty="0"/>
-              <a:t>();</a:t>
-            </a:r>
-          </a:p>
-        </p:txBody>
-      </p:sp>
-      <p:sp>
-        <p:nvSpPr>
-          <p:cNvPr id="24" name="Retângulo 23">
-            <a:extLst>
-              <a:ext uri="{FF2B5EF4-FFF2-40B4-BE49-F238E27FC236}">
-                <a16:creationId xmlns:a16="http://schemas.microsoft.com/office/drawing/2014/main" id="{524DD837-B477-5C49-4DFD-88A4E83A8468}"/>
-              </a:ext>
-            </a:extLst>
-          </p:cNvPr>
-          <p:cNvSpPr/>
-          <p:nvPr/>
-        </p:nvSpPr>
-        <p:spPr>
-          <a:xfrm>
-            <a:off x="3516488" y="1377246"/>
-            <a:ext cx="2427113" cy="434622"/>
-          </a:xfrm>
-          <a:prstGeom prst="rect">
-            <a:avLst/>
-          </a:prstGeom>
-          <a:ln>
-            <a:solidFill>
-              <a:schemeClr val="accent2"/>
-            </a:solidFill>
-          </a:ln>
-        </p:spPr>
-        <p:style>
-          <a:lnRef idx="2">
-            <a:schemeClr val="accent3"/>
-          </a:lnRef>
-          <a:fillRef idx="1">
-            <a:schemeClr val="lt1"/>
-          </a:fillRef>
-          <a:effectRef idx="0">
-            <a:schemeClr val="accent3"/>
-          </a:effectRef>
-          <a:fontRef idx="minor">
-            <a:schemeClr val="dk1"/>
-          </a:fontRef>
-        </p:style>
-        <p:txBody>
-          <a:bodyPr rtlCol="0" anchor="ctr"/>
-          <a:lstStyle/>
-          <a:p>
-            <a:pPr algn="ctr"/>
-            <a:r>
-              <a:rPr lang="pt-BR" dirty="0"/>
-              <a:t>Calculo</a:t>
+              <a:t>Notificação</a:t>
             </a:r>
           </a:p>
         </p:txBody>
@@ -5307,7 +6121,7 @@
     </p:spTree>
     <p:extLst>
       <p:ext uri="{BB962C8B-B14F-4D97-AF65-F5344CB8AC3E}">
-        <p14:creationId xmlns:p14="http://schemas.microsoft.com/office/powerpoint/2010/main" val="3477891738"/>
+        <p14:creationId xmlns:p14="http://schemas.microsoft.com/office/powerpoint/2010/main" val="2925621146"/>
       </p:ext>
     </p:extLst>
   </p:cSld>
@@ -5375,7 +6189,7 @@
           <a:p>
             <a:r>
               <a:rPr lang="pt-BR" dirty="0"/>
-              <a:t> Metas</a:t>
+              <a:t> Visual</a:t>
             </a:r>
           </a:p>
         </p:txBody>
@@ -5421,7 +6235,7 @@
           <a:p>
             <a:r>
               <a:rPr lang="pt-BR" dirty="0" err="1"/>
-              <a:t>criaGuardando</a:t>
+              <a:t>calculaTempoDia</a:t>
             </a:r>
             <a:r>
               <a:rPr lang="pt-BR" dirty="0"/>
@@ -5432,10 +6246,60 @@
       </p:sp>
       <p:sp>
         <p:nvSpPr>
-          <p:cNvPr id="6" name="Retângulo 5">
-            <a:extLst>
-              <a:ext uri="{FF2B5EF4-FFF2-40B4-BE49-F238E27FC236}">
-                <a16:creationId xmlns:a16="http://schemas.microsoft.com/office/drawing/2014/main" id="{C2FBD837-C49F-D874-883F-E35CF6BFB5F2}"/>
+          <p:cNvPr id="4" name="Retângulo 3">
+            <a:extLst>
+              <a:ext uri="{FF2B5EF4-FFF2-40B4-BE49-F238E27FC236}">
+                <a16:creationId xmlns:a16="http://schemas.microsoft.com/office/drawing/2014/main" id="{72D402CB-5970-5957-B782-9E23538E1DE1}"/>
+              </a:ext>
+            </a:extLst>
+          </p:cNvPr>
+          <p:cNvSpPr/>
+          <p:nvPr/>
+        </p:nvSpPr>
+        <p:spPr>
+          <a:xfrm>
+            <a:off x="169333" y="4176900"/>
+            <a:ext cx="3251200" cy="434622"/>
+          </a:xfrm>
+          <a:prstGeom prst="rect">
+            <a:avLst/>
+          </a:prstGeom>
+        </p:spPr>
+        <p:style>
+          <a:lnRef idx="2">
+            <a:schemeClr val="accent6"/>
+          </a:lnRef>
+          <a:fillRef idx="1">
+            <a:schemeClr val="lt1"/>
+          </a:fillRef>
+          <a:effectRef idx="0">
+            <a:schemeClr val="accent6"/>
+          </a:effectRef>
+          <a:fontRef idx="minor">
+            <a:schemeClr val="dk1"/>
+          </a:fontRef>
+        </p:style>
+        <p:txBody>
+          <a:bodyPr rtlCol="0" anchor="ctr"/>
+          <a:lstStyle/>
+          <a:p>
+            <a:r>
+              <a:rPr lang="pt-BR" dirty="0" err="1"/>
+              <a:t>listaUltimosLancamentos</a:t>
+            </a:r>
+            <a:r>
+              <a:rPr lang="pt-BR" dirty="0"/>
+              <a:t>();</a:t>
+            </a:r>
+          </a:p>
+        </p:txBody>
+      </p:sp>
+      <p:sp>
+        <p:nvSpPr>
+          <p:cNvPr id="18" name="Retângulo 17">
+            <a:extLst>
+              <a:ext uri="{FF2B5EF4-FFF2-40B4-BE49-F238E27FC236}">
+                <a16:creationId xmlns:a16="http://schemas.microsoft.com/office/drawing/2014/main" id="{2034A352-027D-CBE7-EC78-6ABBA0E8FD46}"/>
               </a:ext>
             </a:extLst>
           </p:cNvPr>
@@ -5452,7 +6316,7 @@
           </a:prstGeom>
           <a:ln>
             <a:solidFill>
-              <a:srgbClr val="FFFF00"/>
+              <a:schemeClr val="accent2"/>
             </a:solidFill>
           </a:ln>
         </p:spPr>
@@ -5477,7 +6341,680 @@
             <a:pPr algn="ctr"/>
             <a:r>
               <a:rPr lang="pt-BR" dirty="0"/>
-              <a:t>Inserção</a:t>
+              <a:t>Calculo</a:t>
+            </a:r>
+          </a:p>
+        </p:txBody>
+      </p:sp>
+      <p:sp>
+        <p:nvSpPr>
+          <p:cNvPr id="19" name="Retângulo 18">
+            <a:extLst>
+              <a:ext uri="{FF2B5EF4-FFF2-40B4-BE49-F238E27FC236}">
+                <a16:creationId xmlns:a16="http://schemas.microsoft.com/office/drawing/2014/main" id="{3FAE3BB6-7EDE-0F45-86FC-DE4C8BD262CE}"/>
+              </a:ext>
+            </a:extLst>
+          </p:cNvPr>
+          <p:cNvSpPr/>
+          <p:nvPr/>
+        </p:nvSpPr>
+        <p:spPr>
+          <a:xfrm>
+            <a:off x="3516488" y="4165612"/>
+            <a:ext cx="2427113" cy="434622"/>
+          </a:xfrm>
+          <a:prstGeom prst="rect">
+            <a:avLst/>
+          </a:prstGeom>
+          <a:ln>
+            <a:solidFill>
+              <a:srgbClr val="00B0F0"/>
+            </a:solidFill>
+          </a:ln>
+        </p:spPr>
+        <p:style>
+          <a:lnRef idx="2">
+            <a:schemeClr val="accent3"/>
+          </a:lnRef>
+          <a:fillRef idx="1">
+            <a:schemeClr val="lt1"/>
+          </a:fillRef>
+          <a:effectRef idx="0">
+            <a:schemeClr val="accent3"/>
+          </a:effectRef>
+          <a:fontRef idx="minor">
+            <a:schemeClr val="dk1"/>
+          </a:fontRef>
+        </p:style>
+        <p:txBody>
+          <a:bodyPr rtlCol="0" anchor="ctr"/>
+          <a:lstStyle/>
+          <a:p>
+            <a:pPr algn="ctr"/>
+            <a:r>
+              <a:rPr lang="pt-BR" dirty="0"/>
+              <a:t>Listagem</a:t>
+            </a:r>
+          </a:p>
+        </p:txBody>
+      </p:sp>
+      <p:sp>
+        <p:nvSpPr>
+          <p:cNvPr id="21" name="Retângulo 20">
+            <a:extLst>
+              <a:ext uri="{FF2B5EF4-FFF2-40B4-BE49-F238E27FC236}">
+                <a16:creationId xmlns:a16="http://schemas.microsoft.com/office/drawing/2014/main" id="{8E6EB253-E1F5-D0CE-BA5C-3294D7B280ED}"/>
+              </a:ext>
+            </a:extLst>
+          </p:cNvPr>
+          <p:cNvSpPr/>
+          <p:nvPr/>
+        </p:nvSpPr>
+        <p:spPr>
+          <a:xfrm>
+            <a:off x="169333" y="4741346"/>
+            <a:ext cx="3251200" cy="434622"/>
+          </a:xfrm>
+          <a:prstGeom prst="rect">
+            <a:avLst/>
+          </a:prstGeom>
+        </p:spPr>
+        <p:style>
+          <a:lnRef idx="2">
+            <a:schemeClr val="accent6"/>
+          </a:lnRef>
+          <a:fillRef idx="1">
+            <a:schemeClr val="lt1"/>
+          </a:fillRef>
+          <a:effectRef idx="0">
+            <a:schemeClr val="accent6"/>
+          </a:effectRef>
+          <a:fontRef idx="minor">
+            <a:schemeClr val="dk1"/>
+          </a:fontRef>
+        </p:style>
+        <p:txBody>
+          <a:bodyPr rtlCol="0" anchor="ctr"/>
+          <a:lstStyle/>
+          <a:p>
+            <a:r>
+              <a:rPr lang="pt-BR" dirty="0" err="1">
+                <a:solidFill>
+                  <a:schemeClr val="tx1"/>
+                </a:solidFill>
+              </a:rPr>
+              <a:t>mostraMensagem</a:t>
+            </a:r>
+            <a:r>
+              <a:rPr lang="pt-BR" dirty="0">
+                <a:solidFill>
+                  <a:schemeClr val="tx1"/>
+                </a:solidFill>
+              </a:rPr>
+              <a:t>();</a:t>
+            </a:r>
+          </a:p>
+        </p:txBody>
+      </p:sp>
+      <p:sp>
+        <p:nvSpPr>
+          <p:cNvPr id="22" name="Retângulo 21">
+            <a:extLst>
+              <a:ext uri="{FF2B5EF4-FFF2-40B4-BE49-F238E27FC236}">
+                <a16:creationId xmlns:a16="http://schemas.microsoft.com/office/drawing/2014/main" id="{BA2D6CC1-B8E8-2826-9B1B-4D4834830788}"/>
+              </a:ext>
+            </a:extLst>
+          </p:cNvPr>
+          <p:cNvSpPr/>
+          <p:nvPr/>
+        </p:nvSpPr>
+        <p:spPr>
+          <a:xfrm>
+            <a:off x="3516488" y="4746990"/>
+            <a:ext cx="2427113" cy="434622"/>
+          </a:xfrm>
+          <a:prstGeom prst="rect">
+            <a:avLst/>
+          </a:prstGeom>
+          <a:noFill/>
+          <a:ln>
+            <a:solidFill>
+              <a:srgbClr val="7030A0"/>
+            </a:solidFill>
+          </a:ln>
+        </p:spPr>
+        <p:style>
+          <a:lnRef idx="2">
+            <a:schemeClr val="accent3"/>
+          </a:lnRef>
+          <a:fillRef idx="1">
+            <a:schemeClr val="lt1"/>
+          </a:fillRef>
+          <a:effectRef idx="0">
+            <a:schemeClr val="accent3"/>
+          </a:effectRef>
+          <a:fontRef idx="minor">
+            <a:schemeClr val="dk1"/>
+          </a:fontRef>
+        </p:style>
+        <p:txBody>
+          <a:bodyPr rtlCol="0" anchor="ctr"/>
+          <a:lstStyle/>
+          <a:p>
+            <a:pPr algn="ctr"/>
+            <a:r>
+              <a:rPr lang="pt-BR" dirty="0"/>
+              <a:t>Mensagem</a:t>
+            </a:r>
+          </a:p>
+        </p:txBody>
+      </p:sp>
+      <p:sp>
+        <p:nvSpPr>
+          <p:cNvPr id="23" name="Retângulo 22">
+            <a:extLst>
+              <a:ext uri="{FF2B5EF4-FFF2-40B4-BE49-F238E27FC236}">
+                <a16:creationId xmlns:a16="http://schemas.microsoft.com/office/drawing/2014/main" id="{01506A33-EF74-B4D6-07BD-531A273E7902}"/>
+              </a:ext>
+            </a:extLst>
+          </p:cNvPr>
+          <p:cNvSpPr/>
+          <p:nvPr/>
+        </p:nvSpPr>
+        <p:spPr>
+          <a:xfrm>
+            <a:off x="169333" y="1382890"/>
+            <a:ext cx="3251200" cy="434622"/>
+          </a:xfrm>
+          <a:prstGeom prst="rect">
+            <a:avLst/>
+          </a:prstGeom>
+        </p:spPr>
+        <p:style>
+          <a:lnRef idx="2">
+            <a:schemeClr val="accent6"/>
+          </a:lnRef>
+          <a:fillRef idx="1">
+            <a:schemeClr val="lt1"/>
+          </a:fillRef>
+          <a:effectRef idx="0">
+            <a:schemeClr val="accent6"/>
+          </a:effectRef>
+          <a:fontRef idx="minor">
+            <a:schemeClr val="dk1"/>
+          </a:fontRef>
+        </p:style>
+        <p:txBody>
+          <a:bodyPr rtlCol="0" anchor="ctr"/>
+          <a:lstStyle/>
+          <a:p>
+            <a:r>
+              <a:rPr lang="pt-BR" dirty="0" err="1"/>
+              <a:t>setCorLancamento</a:t>
+            </a:r>
+            <a:r>
+              <a:rPr lang="pt-BR" dirty="0"/>
+              <a:t>();</a:t>
+            </a:r>
+          </a:p>
+        </p:txBody>
+      </p:sp>
+      <p:sp>
+        <p:nvSpPr>
+          <p:cNvPr id="24" name="Retângulo 23">
+            <a:extLst>
+              <a:ext uri="{FF2B5EF4-FFF2-40B4-BE49-F238E27FC236}">
+                <a16:creationId xmlns:a16="http://schemas.microsoft.com/office/drawing/2014/main" id="{524DD837-B477-5C49-4DFD-88A4E83A8468}"/>
+              </a:ext>
+            </a:extLst>
+          </p:cNvPr>
+          <p:cNvSpPr/>
+          <p:nvPr/>
+        </p:nvSpPr>
+        <p:spPr>
+          <a:xfrm>
+            <a:off x="3516488" y="1377246"/>
+            <a:ext cx="2427113" cy="434622"/>
+          </a:xfrm>
+          <a:prstGeom prst="rect">
+            <a:avLst/>
+          </a:prstGeom>
+          <a:ln>
+            <a:solidFill>
+              <a:schemeClr val="accent2"/>
+            </a:solidFill>
+          </a:ln>
+        </p:spPr>
+        <p:style>
+          <a:lnRef idx="2">
+            <a:schemeClr val="accent3"/>
+          </a:lnRef>
+          <a:fillRef idx="1">
+            <a:schemeClr val="lt1"/>
+          </a:fillRef>
+          <a:effectRef idx="0">
+            <a:schemeClr val="accent3"/>
+          </a:effectRef>
+          <a:fontRef idx="minor">
+            <a:schemeClr val="dk1"/>
+          </a:fontRef>
+        </p:style>
+        <p:txBody>
+          <a:bodyPr rtlCol="0" anchor="ctr"/>
+          <a:lstStyle/>
+          <a:p>
+            <a:pPr algn="ctr"/>
+            <a:r>
+              <a:rPr lang="pt-BR" dirty="0"/>
+              <a:t>Calculo</a:t>
+            </a:r>
+          </a:p>
+        </p:txBody>
+      </p:sp>
+      <p:sp>
+        <p:nvSpPr>
+          <p:cNvPr id="11" name="Retângulo 10">
+            <a:extLst>
+              <a:ext uri="{FF2B5EF4-FFF2-40B4-BE49-F238E27FC236}">
+                <a16:creationId xmlns:a16="http://schemas.microsoft.com/office/drawing/2014/main" id="{9A01347B-0606-06DF-7390-728FF20DBC71}"/>
+              </a:ext>
+            </a:extLst>
+          </p:cNvPr>
+          <p:cNvSpPr/>
+          <p:nvPr/>
+        </p:nvSpPr>
+        <p:spPr>
+          <a:xfrm>
+            <a:off x="169333" y="1952980"/>
+            <a:ext cx="3251200" cy="434622"/>
+          </a:xfrm>
+          <a:prstGeom prst="rect">
+            <a:avLst/>
+          </a:prstGeom>
+        </p:spPr>
+        <p:style>
+          <a:lnRef idx="2">
+            <a:schemeClr val="accent6"/>
+          </a:lnRef>
+          <a:fillRef idx="1">
+            <a:schemeClr val="lt1"/>
+          </a:fillRef>
+          <a:effectRef idx="0">
+            <a:schemeClr val="accent6"/>
+          </a:effectRef>
+          <a:fontRef idx="minor">
+            <a:schemeClr val="dk1"/>
+          </a:fontRef>
+        </p:style>
+        <p:txBody>
+          <a:bodyPr rtlCol="0" anchor="ctr"/>
+          <a:lstStyle/>
+          <a:p>
+            <a:r>
+              <a:rPr lang="pt-BR" dirty="0" err="1"/>
+              <a:t>calculaTotalUsuarios</a:t>
+            </a:r>
+            <a:r>
+              <a:rPr lang="pt-BR" dirty="0"/>
+              <a:t>();</a:t>
+            </a:r>
+          </a:p>
+        </p:txBody>
+      </p:sp>
+      <p:sp>
+        <p:nvSpPr>
+          <p:cNvPr id="12" name="Retângulo 11">
+            <a:extLst>
+              <a:ext uri="{FF2B5EF4-FFF2-40B4-BE49-F238E27FC236}">
+                <a16:creationId xmlns:a16="http://schemas.microsoft.com/office/drawing/2014/main" id="{BA505DD7-2897-3F0B-3F5B-78306143A2A8}"/>
+              </a:ext>
+            </a:extLst>
+          </p:cNvPr>
+          <p:cNvSpPr/>
+          <p:nvPr/>
+        </p:nvSpPr>
+        <p:spPr>
+          <a:xfrm>
+            <a:off x="3516488" y="1947336"/>
+            <a:ext cx="2427113" cy="434622"/>
+          </a:xfrm>
+          <a:prstGeom prst="rect">
+            <a:avLst/>
+          </a:prstGeom>
+          <a:ln>
+            <a:solidFill>
+              <a:schemeClr val="accent2"/>
+            </a:solidFill>
+          </a:ln>
+        </p:spPr>
+        <p:style>
+          <a:lnRef idx="2">
+            <a:schemeClr val="accent3"/>
+          </a:lnRef>
+          <a:fillRef idx="1">
+            <a:schemeClr val="lt1"/>
+          </a:fillRef>
+          <a:effectRef idx="0">
+            <a:schemeClr val="accent3"/>
+          </a:effectRef>
+          <a:fontRef idx="minor">
+            <a:schemeClr val="dk1"/>
+          </a:fontRef>
+        </p:style>
+        <p:txBody>
+          <a:bodyPr rtlCol="0" anchor="ctr"/>
+          <a:lstStyle/>
+          <a:p>
+            <a:pPr algn="ctr"/>
+            <a:r>
+              <a:rPr lang="pt-BR" dirty="0"/>
+              <a:t>Calculo</a:t>
+            </a:r>
+          </a:p>
+        </p:txBody>
+      </p:sp>
+      <p:sp>
+        <p:nvSpPr>
+          <p:cNvPr id="13" name="Retângulo 12">
+            <a:extLst>
+              <a:ext uri="{FF2B5EF4-FFF2-40B4-BE49-F238E27FC236}">
+                <a16:creationId xmlns:a16="http://schemas.microsoft.com/office/drawing/2014/main" id="{D9677347-E845-7863-7BBB-B27D8A0F5368}"/>
+              </a:ext>
+            </a:extLst>
+          </p:cNvPr>
+          <p:cNvSpPr/>
+          <p:nvPr/>
+        </p:nvSpPr>
+        <p:spPr>
+          <a:xfrm>
+            <a:off x="169333" y="2517426"/>
+            <a:ext cx="3251200" cy="434622"/>
+          </a:xfrm>
+          <a:prstGeom prst="rect">
+            <a:avLst/>
+          </a:prstGeom>
+        </p:spPr>
+        <p:style>
+          <a:lnRef idx="2">
+            <a:schemeClr val="accent6"/>
+          </a:lnRef>
+          <a:fillRef idx="1">
+            <a:schemeClr val="lt1"/>
+          </a:fillRef>
+          <a:effectRef idx="0">
+            <a:schemeClr val="accent6"/>
+          </a:effectRef>
+          <a:fontRef idx="minor">
+            <a:schemeClr val="dk1"/>
+          </a:fontRef>
+        </p:style>
+        <p:txBody>
+          <a:bodyPr rtlCol="0" anchor="ctr"/>
+          <a:lstStyle/>
+          <a:p>
+            <a:r>
+              <a:rPr lang="pt-BR" dirty="0" err="1"/>
+              <a:t>calculaTotalContas</a:t>
+            </a:r>
+            <a:r>
+              <a:rPr lang="pt-BR" dirty="0"/>
+              <a:t>();</a:t>
+            </a:r>
+          </a:p>
+        </p:txBody>
+      </p:sp>
+      <p:sp>
+        <p:nvSpPr>
+          <p:cNvPr id="14" name="Retângulo 13">
+            <a:extLst>
+              <a:ext uri="{FF2B5EF4-FFF2-40B4-BE49-F238E27FC236}">
+                <a16:creationId xmlns:a16="http://schemas.microsoft.com/office/drawing/2014/main" id="{66EA9FAC-A0F0-3058-D66C-2A570BCEDCAC}"/>
+              </a:ext>
+            </a:extLst>
+          </p:cNvPr>
+          <p:cNvSpPr/>
+          <p:nvPr/>
+        </p:nvSpPr>
+        <p:spPr>
+          <a:xfrm>
+            <a:off x="3516488" y="2511782"/>
+            <a:ext cx="2427113" cy="434622"/>
+          </a:xfrm>
+          <a:prstGeom prst="rect">
+            <a:avLst/>
+          </a:prstGeom>
+          <a:ln>
+            <a:solidFill>
+              <a:schemeClr val="accent2"/>
+            </a:solidFill>
+          </a:ln>
+        </p:spPr>
+        <p:style>
+          <a:lnRef idx="2">
+            <a:schemeClr val="accent3"/>
+          </a:lnRef>
+          <a:fillRef idx="1">
+            <a:schemeClr val="lt1"/>
+          </a:fillRef>
+          <a:effectRef idx="0">
+            <a:schemeClr val="accent3"/>
+          </a:effectRef>
+          <a:fontRef idx="minor">
+            <a:schemeClr val="dk1"/>
+          </a:fontRef>
+        </p:style>
+        <p:txBody>
+          <a:bodyPr rtlCol="0" anchor="ctr"/>
+          <a:lstStyle/>
+          <a:p>
+            <a:pPr algn="ctr"/>
+            <a:r>
+              <a:rPr lang="pt-BR" dirty="0"/>
+              <a:t>Calculo</a:t>
+            </a:r>
+          </a:p>
+        </p:txBody>
+      </p:sp>
+      <p:sp>
+        <p:nvSpPr>
+          <p:cNvPr id="15" name="Retângulo 14">
+            <a:extLst>
+              <a:ext uri="{FF2B5EF4-FFF2-40B4-BE49-F238E27FC236}">
+                <a16:creationId xmlns:a16="http://schemas.microsoft.com/office/drawing/2014/main" id="{EEE31788-8AFB-4181-5967-854DA97572DB}"/>
+              </a:ext>
+            </a:extLst>
+          </p:cNvPr>
+          <p:cNvSpPr/>
+          <p:nvPr/>
+        </p:nvSpPr>
+        <p:spPr>
+          <a:xfrm>
+            <a:off x="169333" y="3076228"/>
+            <a:ext cx="3251200" cy="434622"/>
+          </a:xfrm>
+          <a:prstGeom prst="rect">
+            <a:avLst/>
+          </a:prstGeom>
+        </p:spPr>
+        <p:style>
+          <a:lnRef idx="2">
+            <a:schemeClr val="accent6"/>
+          </a:lnRef>
+          <a:fillRef idx="1">
+            <a:schemeClr val="lt1"/>
+          </a:fillRef>
+          <a:effectRef idx="0">
+            <a:schemeClr val="accent6"/>
+          </a:effectRef>
+          <a:fontRef idx="minor">
+            <a:schemeClr val="dk1"/>
+          </a:fontRef>
+        </p:style>
+        <p:txBody>
+          <a:bodyPr rtlCol="0" anchor="ctr"/>
+          <a:lstStyle/>
+          <a:p>
+            <a:r>
+              <a:rPr lang="pt-BR" dirty="0" err="1"/>
+              <a:t>calculaTotalCartoes</a:t>
+            </a:r>
+            <a:r>
+              <a:rPr lang="pt-BR" dirty="0"/>
+              <a:t>();</a:t>
+            </a:r>
+          </a:p>
+        </p:txBody>
+      </p:sp>
+      <p:sp>
+        <p:nvSpPr>
+          <p:cNvPr id="16" name="Retângulo 15">
+            <a:extLst>
+              <a:ext uri="{FF2B5EF4-FFF2-40B4-BE49-F238E27FC236}">
+                <a16:creationId xmlns:a16="http://schemas.microsoft.com/office/drawing/2014/main" id="{7BE7534A-9A83-3F4C-5066-CE5F19586ABD}"/>
+              </a:ext>
+            </a:extLst>
+          </p:cNvPr>
+          <p:cNvSpPr/>
+          <p:nvPr/>
+        </p:nvSpPr>
+        <p:spPr>
+          <a:xfrm>
+            <a:off x="3516488" y="3070584"/>
+            <a:ext cx="2427113" cy="434622"/>
+          </a:xfrm>
+          <a:prstGeom prst="rect">
+            <a:avLst/>
+          </a:prstGeom>
+          <a:ln>
+            <a:solidFill>
+              <a:schemeClr val="accent2"/>
+            </a:solidFill>
+          </a:ln>
+        </p:spPr>
+        <p:style>
+          <a:lnRef idx="2">
+            <a:schemeClr val="accent3"/>
+          </a:lnRef>
+          <a:fillRef idx="1">
+            <a:schemeClr val="lt1"/>
+          </a:fillRef>
+          <a:effectRef idx="0">
+            <a:schemeClr val="accent3"/>
+          </a:effectRef>
+          <a:fontRef idx="minor">
+            <a:schemeClr val="dk1"/>
+          </a:fontRef>
+        </p:style>
+        <p:txBody>
+          <a:bodyPr rtlCol="0" anchor="ctr"/>
+          <a:lstStyle/>
+          <a:p>
+            <a:pPr algn="ctr"/>
+            <a:r>
+              <a:rPr lang="pt-BR" dirty="0"/>
+              <a:t>Calculo</a:t>
+            </a:r>
+          </a:p>
+        </p:txBody>
+      </p:sp>
+      <p:sp>
+        <p:nvSpPr>
+          <p:cNvPr id="17" name="Retângulo 16">
+            <a:extLst>
+              <a:ext uri="{FF2B5EF4-FFF2-40B4-BE49-F238E27FC236}">
+                <a16:creationId xmlns:a16="http://schemas.microsoft.com/office/drawing/2014/main" id="{57789AFD-C7C9-F7EE-8CE0-6FA3C5A54473}"/>
+              </a:ext>
+            </a:extLst>
+          </p:cNvPr>
+          <p:cNvSpPr/>
+          <p:nvPr/>
+        </p:nvSpPr>
+        <p:spPr>
+          <a:xfrm>
+            <a:off x="169333" y="3629386"/>
+            <a:ext cx="3251200" cy="434622"/>
+          </a:xfrm>
+          <a:prstGeom prst="rect">
+            <a:avLst/>
+          </a:prstGeom>
+        </p:spPr>
+        <p:style>
+          <a:lnRef idx="2">
+            <a:schemeClr val="accent6"/>
+          </a:lnRef>
+          <a:fillRef idx="1">
+            <a:schemeClr val="lt1"/>
+          </a:fillRef>
+          <a:effectRef idx="0">
+            <a:schemeClr val="accent6"/>
+          </a:effectRef>
+          <a:fontRef idx="minor">
+            <a:schemeClr val="dk1"/>
+          </a:fontRef>
+        </p:style>
+        <p:txBody>
+          <a:bodyPr rtlCol="0" anchor="ctr"/>
+          <a:lstStyle/>
+          <a:p>
+            <a:r>
+              <a:rPr lang="pt-BR" dirty="0" err="1"/>
+              <a:t>calculaTotalLancamentos</a:t>
+            </a:r>
+            <a:r>
+              <a:rPr lang="pt-BR" dirty="0"/>
+              <a:t>();</a:t>
+            </a:r>
+          </a:p>
+        </p:txBody>
+      </p:sp>
+      <p:sp>
+        <p:nvSpPr>
+          <p:cNvPr id="20" name="Retângulo 19">
+            <a:extLst>
+              <a:ext uri="{FF2B5EF4-FFF2-40B4-BE49-F238E27FC236}">
+                <a16:creationId xmlns:a16="http://schemas.microsoft.com/office/drawing/2014/main" id="{887C482C-2612-9418-E674-14E44E075848}"/>
+              </a:ext>
+            </a:extLst>
+          </p:cNvPr>
+          <p:cNvSpPr/>
+          <p:nvPr/>
+        </p:nvSpPr>
+        <p:spPr>
+          <a:xfrm>
+            <a:off x="3516488" y="3623742"/>
+            <a:ext cx="2427113" cy="434622"/>
+          </a:xfrm>
+          <a:prstGeom prst="rect">
+            <a:avLst/>
+          </a:prstGeom>
+          <a:ln>
+            <a:solidFill>
+              <a:schemeClr val="accent2"/>
+            </a:solidFill>
+          </a:ln>
+        </p:spPr>
+        <p:style>
+          <a:lnRef idx="2">
+            <a:schemeClr val="accent3"/>
+          </a:lnRef>
+          <a:fillRef idx="1">
+            <a:schemeClr val="lt1"/>
+          </a:fillRef>
+          <a:effectRef idx="0">
+            <a:schemeClr val="accent3"/>
+          </a:effectRef>
+          <a:fontRef idx="minor">
+            <a:schemeClr val="dk1"/>
+          </a:fontRef>
+        </p:style>
+        <p:txBody>
+          <a:bodyPr rtlCol="0" anchor="ctr"/>
+          <a:lstStyle/>
+          <a:p>
+            <a:pPr algn="ctr"/>
+            <a:r>
+              <a:rPr lang="pt-BR" dirty="0"/>
+              <a:t>Calculo</a:t>
             </a:r>
           </a:p>
         </p:txBody>
@@ -5485,7 +7022,7 @@
     </p:spTree>
     <p:extLst>
       <p:ext uri="{BB962C8B-B14F-4D97-AF65-F5344CB8AC3E}">
-        <p14:creationId xmlns:p14="http://schemas.microsoft.com/office/powerpoint/2010/main" val="381182760"/>
+        <p14:creationId xmlns:p14="http://schemas.microsoft.com/office/powerpoint/2010/main" val="3477891738"/>
       </p:ext>
     </p:extLst>
   </p:cSld>
@@ -5553,6 +7090,184 @@
           <a:p>
             <a:r>
               <a:rPr lang="pt-BR" dirty="0"/>
+              <a:t> Metas</a:t>
+            </a:r>
+          </a:p>
+        </p:txBody>
+      </p:sp>
+      <p:sp>
+        <p:nvSpPr>
+          <p:cNvPr id="3" name="Retângulo 2">
+            <a:extLst>
+              <a:ext uri="{FF2B5EF4-FFF2-40B4-BE49-F238E27FC236}">
+                <a16:creationId xmlns:a16="http://schemas.microsoft.com/office/drawing/2014/main" id="{7B639197-2319-744D-6458-22D306079209}"/>
+              </a:ext>
+            </a:extLst>
+          </p:cNvPr>
+          <p:cNvSpPr/>
+          <p:nvPr/>
+        </p:nvSpPr>
+        <p:spPr>
+          <a:xfrm>
+            <a:off x="169333" y="807156"/>
+            <a:ext cx="3251200" cy="434622"/>
+          </a:xfrm>
+          <a:prstGeom prst="rect">
+            <a:avLst/>
+          </a:prstGeom>
+        </p:spPr>
+        <p:style>
+          <a:lnRef idx="2">
+            <a:schemeClr val="accent6"/>
+          </a:lnRef>
+          <a:fillRef idx="1">
+            <a:schemeClr val="lt1"/>
+          </a:fillRef>
+          <a:effectRef idx="0">
+            <a:schemeClr val="accent6"/>
+          </a:effectRef>
+          <a:fontRef idx="minor">
+            <a:schemeClr val="dk1"/>
+          </a:fontRef>
+        </p:style>
+        <p:txBody>
+          <a:bodyPr rtlCol="0" anchor="ctr"/>
+          <a:lstStyle/>
+          <a:p>
+            <a:r>
+              <a:rPr lang="pt-BR" dirty="0" err="1"/>
+              <a:t>criaGuardando</a:t>
+            </a:r>
+            <a:r>
+              <a:rPr lang="pt-BR" dirty="0"/>
+              <a:t>();</a:t>
+            </a:r>
+          </a:p>
+        </p:txBody>
+      </p:sp>
+      <p:sp>
+        <p:nvSpPr>
+          <p:cNvPr id="6" name="Retângulo 5">
+            <a:extLst>
+              <a:ext uri="{FF2B5EF4-FFF2-40B4-BE49-F238E27FC236}">
+                <a16:creationId xmlns:a16="http://schemas.microsoft.com/office/drawing/2014/main" id="{C2FBD837-C49F-D874-883F-E35CF6BFB5F2}"/>
+              </a:ext>
+            </a:extLst>
+          </p:cNvPr>
+          <p:cNvSpPr/>
+          <p:nvPr/>
+        </p:nvSpPr>
+        <p:spPr>
+          <a:xfrm>
+            <a:off x="3516488" y="801512"/>
+            <a:ext cx="2427113" cy="434622"/>
+          </a:xfrm>
+          <a:prstGeom prst="rect">
+            <a:avLst/>
+          </a:prstGeom>
+          <a:ln>
+            <a:solidFill>
+              <a:srgbClr val="FFFF00"/>
+            </a:solidFill>
+          </a:ln>
+        </p:spPr>
+        <p:style>
+          <a:lnRef idx="2">
+            <a:schemeClr val="accent3"/>
+          </a:lnRef>
+          <a:fillRef idx="1">
+            <a:schemeClr val="lt1"/>
+          </a:fillRef>
+          <a:effectRef idx="0">
+            <a:schemeClr val="accent3"/>
+          </a:effectRef>
+          <a:fontRef idx="minor">
+            <a:schemeClr val="dk1"/>
+          </a:fontRef>
+        </p:style>
+        <p:txBody>
+          <a:bodyPr rtlCol="0" anchor="ctr"/>
+          <a:lstStyle/>
+          <a:p>
+            <a:pPr algn="ctr"/>
+            <a:r>
+              <a:rPr lang="pt-BR" dirty="0"/>
+              <a:t>Inserção</a:t>
+            </a:r>
+          </a:p>
+        </p:txBody>
+      </p:sp>
+    </p:spTree>
+    <p:extLst>
+      <p:ext uri="{BB962C8B-B14F-4D97-AF65-F5344CB8AC3E}">
+        <p14:creationId xmlns:p14="http://schemas.microsoft.com/office/powerpoint/2010/main" val="381182760"/>
+      </p:ext>
+    </p:extLst>
+  </p:cSld>
+  <p:clrMapOvr>
+    <a:masterClrMapping/>
+  </p:clrMapOvr>
+</p:sld>
+</file>
+
+<file path=ppt/slides/slide5.xml><?xml version="1.0" encoding="utf-8"?>
+<p:sld xmlns:a="http://schemas.openxmlformats.org/drawingml/2006/main" xmlns:r="http://schemas.openxmlformats.org/officeDocument/2006/relationships" xmlns:p="http://schemas.openxmlformats.org/presentationml/2006/main">
+  <p:cSld>
+    <p:spTree>
+      <p:nvGrpSpPr>
+        <p:cNvPr id="1" name=""/>
+        <p:cNvGrpSpPr/>
+        <p:nvPr/>
+      </p:nvGrpSpPr>
+      <p:grpSpPr>
+        <a:xfrm>
+          <a:off x="0" y="0"/>
+          <a:ext cx="0" cy="0"/>
+          <a:chOff x="0" y="0"/>
+          <a:chExt cx="0" cy="0"/>
+        </a:xfrm>
+      </p:grpSpPr>
+      <p:sp>
+        <p:nvSpPr>
+          <p:cNvPr id="2" name="Retângulo 1">
+            <a:extLst>
+              <a:ext uri="{FF2B5EF4-FFF2-40B4-BE49-F238E27FC236}">
+                <a16:creationId xmlns:a16="http://schemas.microsoft.com/office/drawing/2014/main" id="{16332B39-1462-A983-6063-87B5D111153A}"/>
+              </a:ext>
+            </a:extLst>
+          </p:cNvPr>
+          <p:cNvSpPr/>
+          <p:nvPr/>
+        </p:nvSpPr>
+        <p:spPr>
+          <a:xfrm>
+            <a:off x="169333" y="101600"/>
+            <a:ext cx="11830756" cy="553156"/>
+          </a:xfrm>
+          <a:prstGeom prst="rect">
+            <a:avLst/>
+          </a:prstGeom>
+        </p:spPr>
+        <p:style>
+          <a:lnRef idx="2">
+            <a:schemeClr val="accent6"/>
+          </a:lnRef>
+          <a:fillRef idx="1">
+            <a:schemeClr val="lt1"/>
+          </a:fillRef>
+          <a:effectRef idx="0">
+            <a:schemeClr val="accent6"/>
+          </a:effectRef>
+          <a:fontRef idx="minor">
+            <a:schemeClr val="dk1"/>
+          </a:fontRef>
+        </p:style>
+        <p:txBody>
+          <a:bodyPr rtlCol="0" anchor="ctr"/>
+          <a:lstStyle/>
+          <a:p>
+            <a:r>
+              <a:rPr lang="pt-BR" dirty="0"/>
               <a:t> Carteira</a:t>
             </a:r>
           </a:p>
@@ -7206,7 +8921,7 @@
 </p:sld>
 </file>
 
-<file path=ppt/slides/slide5.xml><?xml version="1.0" encoding="utf-8"?>
+<file path=ppt/slides/slide6.xml><?xml version="1.0" encoding="utf-8"?>
 <p:sld xmlns:a="http://schemas.openxmlformats.org/drawingml/2006/main" xmlns:r="http://schemas.openxmlformats.org/officeDocument/2006/relationships" xmlns:p="http://schemas.openxmlformats.org/presentationml/2006/main">
   <p:cSld>
     <p:spTree>
@@ -9234,4 +10949,299 @@
     </a:ext>
   </a:extLst>
 </a:theme>
+</file>
+
+<file path=ppt/theme/theme2.xml><?xml version="1.0" encoding="utf-8"?>
+<a:theme xmlns:a="http://schemas.openxmlformats.org/drawingml/2006/main" name="Tema do Office">
+  <a:themeElements>
+    <a:clrScheme name="Office">
+      <a:dk1>
+        <a:sysClr val="windowText" lastClr="000000"/>
+      </a:dk1>
+      <a:lt1>
+        <a:sysClr val="window" lastClr="FFFFFF"/>
+      </a:lt1>
+      <a:dk2>
+        <a:srgbClr val="44546A"/>
+      </a:dk2>
+      <a:lt2>
+        <a:srgbClr val="E7E6E6"/>
+      </a:lt2>
+      <a:accent1>
+        <a:srgbClr val="4472C4"/>
+      </a:accent1>
+      <a:accent2>
+        <a:srgbClr val="ED7D31"/>
+      </a:accent2>
+      <a:accent3>
+        <a:srgbClr val="A5A5A5"/>
+      </a:accent3>
+      <a:accent4>
+        <a:srgbClr val="FFC000"/>
+      </a:accent4>
+      <a:accent5>
+        <a:srgbClr val="5B9BD5"/>
+      </a:accent5>
+      <a:accent6>
+        <a:srgbClr val="70AD47"/>
+      </a:accent6>
+      <a:hlink>
+        <a:srgbClr val="0563C1"/>
+      </a:hlink>
+      <a:folHlink>
+        <a:srgbClr val="954F72"/>
+      </a:folHlink>
+    </a:clrScheme>
+    <a:fontScheme name="Office">
+      <a:majorFont>
+        <a:latin typeface="Calibri Light" panose="020F0302020204030204"/>
+        <a:ea typeface=""/>
+        <a:cs typeface=""/>
+        <a:font script="Jpan" typeface="游ゴシック Light"/>
+        <a:font script="Hang" typeface="맑은 고딕"/>
+        <a:font script="Hans" typeface="等线 Light"/>
+        <a:font script="Hant" typeface="新細明體"/>
+        <a:font script="Arab" typeface="Times New Roman"/>
+        <a:font script="Hebr" typeface="Times New Roman"/>
+        <a:font script="Thai" typeface="Angsana New"/>
+        <a:font script="Ethi" typeface="Nyala"/>
+        <a:font script="Beng" typeface="Vrinda"/>
+        <a:font script="Gujr" typeface="Shruti"/>
+        <a:font script="Khmr" typeface="MoolBoran"/>
+        <a:font script="Knda" typeface="Tunga"/>
+        <a:font script="Guru" typeface="Raavi"/>
+        <a:font script="Cans" typeface="Euphemia"/>
+        <a:font script="Cher" typeface="Plantagenet Cherokee"/>
+        <a:font script="Yiii" typeface="Microsoft Yi Baiti"/>
+        <a:font script="Tibt" typeface="Microsoft Himalaya"/>
+        <a:font script="Thaa" typeface="MV Boli"/>
+        <a:font script="Deva" typeface="Mangal"/>
+        <a:font script="Telu" typeface="Gautami"/>
+        <a:font script="Taml" typeface="Latha"/>
+        <a:font script="Syrc" typeface="Estrangelo Edessa"/>
+        <a:font script="Orya" typeface="Kalinga"/>
+        <a:font script="Mlym" typeface="Kartika"/>
+        <a:font script="Laoo" typeface="DokChampa"/>
+        <a:font script="Sinh" typeface="Iskoola Pota"/>
+        <a:font script="Mong" typeface="Mongolian Baiti"/>
+        <a:font script="Viet" typeface="Times New Roman"/>
+        <a:font script="Uigh" typeface="Microsoft Uighur"/>
+        <a:font script="Geor" typeface="Sylfaen"/>
+        <a:font script="Armn" typeface="Arial"/>
+        <a:font script="Bugi" typeface="Leelawadee UI"/>
+        <a:font script="Bopo" typeface="Microsoft JhengHei"/>
+        <a:font script="Java" typeface="Javanese Text"/>
+        <a:font script="Lisu" typeface="Segoe UI"/>
+        <a:font script="Mymr" typeface="Myanmar Text"/>
+        <a:font script="Nkoo" typeface="Ebrima"/>
+        <a:font script="Olck" typeface="Nirmala UI"/>
+        <a:font script="Osma" typeface="Ebrima"/>
+        <a:font script="Phag" typeface="Phagspa"/>
+        <a:font script="Syrn" typeface="Estrangelo Edessa"/>
+        <a:font script="Syrj" typeface="Estrangelo Edessa"/>
+        <a:font script="Syre" typeface="Estrangelo Edessa"/>
+        <a:font script="Sora" typeface="Nirmala UI"/>
+        <a:font script="Tale" typeface="Microsoft Tai Le"/>
+        <a:font script="Talu" typeface="Microsoft New Tai Lue"/>
+        <a:font script="Tfng" typeface="Ebrima"/>
+      </a:majorFont>
+      <a:minorFont>
+        <a:latin typeface="Calibri" panose="020F0502020204030204"/>
+        <a:ea typeface=""/>
+        <a:cs typeface=""/>
+        <a:font script="Jpan" typeface="游ゴシック"/>
+        <a:font script="Hang" typeface="맑은 고딕"/>
+        <a:font script="Hans" typeface="等线"/>
+        <a:font script="Hant" typeface="新細明體"/>
+        <a:font script="Arab" typeface="Arial"/>
+        <a:font script="Hebr" typeface="Arial"/>
+        <a:font script="Thai" typeface="Cordia New"/>
+        <a:font script="Ethi" typeface="Nyala"/>
+        <a:font script="Beng" typeface="Vrinda"/>
+        <a:font script="Gujr" typeface="Shruti"/>
+        <a:font script="Khmr" typeface="DaunPenh"/>
+        <a:font script="Knda" typeface="Tunga"/>
+        <a:font script="Guru" typeface="Raavi"/>
+        <a:font script="Cans" typeface="Euphemia"/>
+        <a:font script="Cher" typeface="Plantagenet Cherokee"/>
+        <a:font script="Yiii" typeface="Microsoft Yi Baiti"/>
+        <a:font script="Tibt" typeface="Microsoft Himalaya"/>
+        <a:font script="Thaa" typeface="MV Boli"/>
+        <a:font script="Deva" typeface="Mangal"/>
+        <a:font script="Telu" typeface="Gautami"/>
+        <a:font script="Taml" typeface="Latha"/>
+        <a:font script="Syrc" typeface="Estrangelo Edessa"/>
+        <a:font script="Orya" typeface="Kalinga"/>
+        <a:font script="Mlym" typeface="Kartika"/>
+        <a:font script="Laoo" typeface="DokChampa"/>
+        <a:font script="Sinh" typeface="Iskoola Pota"/>
+        <a:font script="Mong" typeface="Mongolian Baiti"/>
+        <a:font script="Viet" typeface="Arial"/>
+        <a:font script="Uigh" typeface="Microsoft Uighur"/>
+        <a:font script="Geor" typeface="Sylfaen"/>
+        <a:font script="Armn" typeface="Arial"/>
+        <a:font script="Bugi" typeface="Leelawadee UI"/>
+        <a:font script="Bopo" typeface="Microsoft JhengHei"/>
+        <a:font script="Java" typeface="Javanese Text"/>
+        <a:font script="Lisu" typeface="Segoe UI"/>
+        <a:font script="Mymr" typeface="Myanmar Text"/>
+        <a:font script="Nkoo" typeface="Ebrima"/>
+        <a:font script="Olck" typeface="Nirmala UI"/>
+        <a:font script="Osma" typeface="Ebrima"/>
+        <a:font script="Phag" typeface="Phagspa"/>
+        <a:font script="Syrn" typeface="Estrangelo Edessa"/>
+        <a:font script="Syrj" typeface="Estrangelo Edessa"/>
+        <a:font script="Syre" typeface="Estrangelo Edessa"/>
+        <a:font script="Sora" typeface="Nirmala UI"/>
+        <a:font script="Tale" typeface="Microsoft Tai Le"/>
+        <a:font script="Talu" typeface="Microsoft New Tai Lue"/>
+        <a:font script="Tfng" typeface="Ebrima"/>
+      </a:minorFont>
+    </a:fontScheme>
+    <a:fmtScheme name="Office">
+      <a:fillStyleLst>
+        <a:solidFill>
+          <a:schemeClr val="phClr"/>
+        </a:solidFill>
+        <a:gradFill rotWithShape="1">
+          <a:gsLst>
+            <a:gs pos="0">
+              <a:schemeClr val="phClr">
+                <a:lumMod val="110000"/>
+                <a:satMod val="105000"/>
+                <a:tint val="67000"/>
+              </a:schemeClr>
+            </a:gs>
+            <a:gs pos="50000">
+              <a:schemeClr val="phClr">
+                <a:lumMod val="105000"/>
+                <a:satMod val="103000"/>
+                <a:tint val="73000"/>
+              </a:schemeClr>
+            </a:gs>
+            <a:gs pos="100000">
+              <a:schemeClr val="phClr">
+                <a:lumMod val="105000"/>
+                <a:satMod val="109000"/>
+                <a:tint val="81000"/>
+              </a:schemeClr>
+            </a:gs>
+          </a:gsLst>
+          <a:lin ang="5400000" scaled="0"/>
+        </a:gradFill>
+        <a:gradFill rotWithShape="1">
+          <a:gsLst>
+            <a:gs pos="0">
+              <a:schemeClr val="phClr">
+                <a:satMod val="103000"/>
+                <a:lumMod val="102000"/>
+                <a:tint val="94000"/>
+              </a:schemeClr>
+            </a:gs>
+            <a:gs pos="50000">
+              <a:schemeClr val="phClr">
+                <a:satMod val="110000"/>
+                <a:lumMod val="100000"/>
+                <a:shade val="100000"/>
+              </a:schemeClr>
+            </a:gs>
+            <a:gs pos="100000">
+              <a:schemeClr val="phClr">
+                <a:lumMod val="99000"/>
+                <a:satMod val="120000"/>
+                <a:shade val="78000"/>
+              </a:schemeClr>
+            </a:gs>
+          </a:gsLst>
+          <a:lin ang="5400000" scaled="0"/>
+        </a:gradFill>
+      </a:fillStyleLst>
+      <a:lnStyleLst>
+        <a:ln w="6350" cap="flat" cmpd="sng" algn="ctr">
+          <a:solidFill>
+            <a:schemeClr val="phClr"/>
+          </a:solidFill>
+          <a:prstDash val="solid"/>
+          <a:miter lim="800000"/>
+        </a:ln>
+        <a:ln w="12700" cap="flat" cmpd="sng" algn="ctr">
+          <a:solidFill>
+            <a:schemeClr val="phClr"/>
+          </a:solidFill>
+          <a:prstDash val="solid"/>
+          <a:miter lim="800000"/>
+        </a:ln>
+        <a:ln w="19050" cap="flat" cmpd="sng" algn="ctr">
+          <a:solidFill>
+            <a:schemeClr val="phClr"/>
+          </a:solidFill>
+          <a:prstDash val="solid"/>
+          <a:miter lim="800000"/>
+        </a:ln>
+      </a:lnStyleLst>
+      <a:effectStyleLst>
+        <a:effectStyle>
+          <a:effectLst/>
+        </a:effectStyle>
+        <a:effectStyle>
+          <a:effectLst/>
+        </a:effectStyle>
+        <a:effectStyle>
+          <a:effectLst>
+            <a:outerShdw blurRad="57150" dist="19050" dir="5400000" algn="ctr" rotWithShape="0">
+              <a:srgbClr val="000000">
+                <a:alpha val="63000"/>
+              </a:srgbClr>
+            </a:outerShdw>
+          </a:effectLst>
+        </a:effectStyle>
+      </a:effectStyleLst>
+      <a:bgFillStyleLst>
+        <a:solidFill>
+          <a:schemeClr val="phClr"/>
+        </a:solidFill>
+        <a:solidFill>
+          <a:schemeClr val="phClr">
+            <a:tint val="95000"/>
+            <a:satMod val="170000"/>
+          </a:schemeClr>
+        </a:solidFill>
+        <a:gradFill rotWithShape="1">
+          <a:gsLst>
+            <a:gs pos="0">
+              <a:schemeClr val="phClr">
+                <a:tint val="93000"/>
+                <a:satMod val="150000"/>
+                <a:shade val="98000"/>
+                <a:lumMod val="102000"/>
+              </a:schemeClr>
+            </a:gs>
+            <a:gs pos="50000">
+              <a:schemeClr val="phClr">
+                <a:tint val="98000"/>
+                <a:satMod val="130000"/>
+                <a:shade val="90000"/>
+                <a:lumMod val="103000"/>
+              </a:schemeClr>
+            </a:gs>
+            <a:gs pos="100000">
+              <a:schemeClr val="phClr">
+                <a:shade val="63000"/>
+                <a:satMod val="120000"/>
+              </a:schemeClr>
+            </a:gs>
+          </a:gsLst>
+          <a:lin ang="5400000" scaled="0"/>
+        </a:gradFill>
+      </a:bgFillStyleLst>
+    </a:fmtScheme>
+  </a:themeElements>
+  <a:objectDefaults/>
+  <a:extraClrSchemeLst/>
+  <a:extLst>
+    <a:ext uri="{05A4C25C-085E-4340-85A3-A5531E510DB2}">
+      <thm15:themeFamily xmlns:thm15="http://schemas.microsoft.com/office/thememl/2012/main" name="Office Theme" id="{62F939B6-93AF-4DB8-9C6B-D6C7DFDC589F}" vid="{4A3C46E8-61CC-4603-A589-7422A47A8E4A}"/>
+    </a:ext>
+  </a:extLst>
+</a:theme>
 </file>
</xml_diff>